<commit_message>
Add progress log to eventAnnotateList (#12)
</commit_message>
<xml_diff>
--- a/docs/splice-event-annotation.pptx
+++ b/docs/splice-event-annotation.pptx
@@ -7,6 +7,11 @@
   <p:sldIdLst>
     <p:sldId id="256" r:id="rId2"/>
     <p:sldId id="257" r:id="rId3"/>
+    <p:sldId id="259" r:id="rId4"/>
+    <p:sldId id="258" r:id="rId5"/>
+    <p:sldId id="261" r:id="rId6"/>
+    <p:sldId id="262" r:id="rId7"/>
+    <p:sldId id="263" r:id="rId8"/>
   </p:sldIdLst>
   <p:sldSz cx="12192000" cy="6858000"/>
   <p:notesSz cx="6858000" cy="9144000"/>
@@ -105,7 +110,364 @@
       </a:defRPr>
     </a:lvl9pPr>
   </p:defaultTextStyle>
+  <p:extLst>
+    <p:ext uri="{EFAFB233-063F-42B5-8137-9DF3F51BA10A}">
+      <p15:sldGuideLst xmlns:p15="http://schemas.microsoft.com/office/powerpoint/2012/main"/>
+    </p:ext>
+  </p:extLst>
 </p:presentation>
+</file>
+
+<file path=ppt/revisionInfo.xml><?xml version="1.0" encoding="utf-8"?>
+<p1510:revInfo xmlns:a="http://schemas.openxmlformats.org/drawingml/2006/main" xmlns:r="http://schemas.openxmlformats.org/officeDocument/2006/relationships" xmlns:p1510="http://schemas.microsoft.com/office/powerpoint/2015/10/main">
+  <p1510:revLst>
+    <p1510:client id="{7133A3CE-13BC-A846-BD39-2206C18E2A82}" v="26" dt="2024-05-20T04:43:27.184"/>
+  </p1510:revLst>
+</p1510:revInfo>
+</file>
+
+<file path=ppt/changesInfos/changesInfo1.xml><?xml version="1.0" encoding="utf-8"?>
+<pc:chgInfo xmlns:a="http://schemas.openxmlformats.org/drawingml/2006/main" xmlns:r="http://schemas.openxmlformats.org/officeDocument/2006/relationships" xmlns:ac="http://schemas.microsoft.com/office/drawing/2013/main/command" xmlns:pc="http://schemas.microsoft.com/office/powerpoint/2013/main/command">
+  <pc:docChgLst>
+    <pc:chgData name="Rhett Marchant" userId="18df2c221d5c7175" providerId="LiveId" clId="{7133A3CE-13BC-A846-BD39-2206C18E2A82}"/>
+    <pc:docChg chg="undo custSel addSld delSld modSld sldOrd">
+      <pc:chgData name="Rhett Marchant" userId="18df2c221d5c7175" providerId="LiveId" clId="{7133A3CE-13BC-A846-BD39-2206C18E2A82}" dt="2024-05-20T04:43:52.582" v="609" actId="1076"/>
+      <pc:docMkLst>
+        <pc:docMk/>
+      </pc:docMkLst>
+      <pc:sldChg chg="addSp delSp modSp new mod">
+        <pc:chgData name="Rhett Marchant" userId="18df2c221d5c7175" providerId="LiveId" clId="{7133A3CE-13BC-A846-BD39-2206C18E2A82}" dt="2024-05-20T04:18:29.911" v="435" actId="21"/>
+        <pc:sldMkLst>
+          <pc:docMk/>
+          <pc:sldMk cId="2871830996" sldId="258"/>
+        </pc:sldMkLst>
+        <pc:spChg chg="mod">
+          <ac:chgData name="Rhett Marchant" userId="18df2c221d5c7175" providerId="LiveId" clId="{7133A3CE-13BC-A846-BD39-2206C18E2A82}" dt="2024-05-20T02:53:02.502" v="24" actId="114"/>
+          <ac:spMkLst>
+            <pc:docMk/>
+            <pc:sldMk cId="2871830996" sldId="258"/>
+            <ac:spMk id="2" creationId="{249115FB-225B-60BD-2028-785633E8564D}"/>
+          </ac:spMkLst>
+        </pc:spChg>
+        <pc:spChg chg="del">
+          <ac:chgData name="Rhett Marchant" userId="18df2c221d5c7175" providerId="LiveId" clId="{7133A3CE-13BC-A846-BD39-2206C18E2A82}" dt="2024-05-20T02:51:43.529" v="5"/>
+          <ac:spMkLst>
+            <pc:docMk/>
+            <pc:sldMk cId="2871830996" sldId="258"/>
+            <ac:spMk id="3" creationId="{A1ADDCE9-4E99-C335-3C18-D70FCBA5B953}"/>
+          </ac:spMkLst>
+        </pc:spChg>
+        <pc:spChg chg="add mod">
+          <ac:chgData name="Rhett Marchant" userId="18df2c221d5c7175" providerId="LiveId" clId="{7133A3CE-13BC-A846-BD39-2206C18E2A82}" dt="2024-05-20T03:14:37.816" v="49" actId="1076"/>
+          <ac:spMkLst>
+            <pc:docMk/>
+            <pc:sldMk cId="2871830996" sldId="258"/>
+            <ac:spMk id="7" creationId="{6D3E756C-8855-57B2-AAB6-68D3885C2710}"/>
+          </ac:spMkLst>
+        </pc:spChg>
+        <pc:spChg chg="add mod">
+          <ac:chgData name="Rhett Marchant" userId="18df2c221d5c7175" providerId="LiveId" clId="{7133A3CE-13BC-A846-BD39-2206C18E2A82}" dt="2024-05-20T03:14:53.387" v="74" actId="1076"/>
+          <ac:spMkLst>
+            <pc:docMk/>
+            <pc:sldMk cId="2871830996" sldId="258"/>
+            <ac:spMk id="8" creationId="{60E3A48F-E9C7-57C6-3EDC-D4D2D75D7EB0}"/>
+          </ac:spMkLst>
+        </pc:spChg>
+        <pc:picChg chg="add mod modCrop">
+          <ac:chgData name="Rhett Marchant" userId="18df2c221d5c7175" providerId="LiveId" clId="{7133A3CE-13BC-A846-BD39-2206C18E2A82}" dt="2024-05-20T03:14:53.387" v="74" actId="1076"/>
+          <ac:picMkLst>
+            <pc:docMk/>
+            <pc:sldMk cId="2871830996" sldId="258"/>
+            <ac:picMk id="5" creationId="{BE882182-287A-DF7D-7FBF-290B152372A8}"/>
+          </ac:picMkLst>
+        </pc:picChg>
+        <pc:picChg chg="add mod modCrop">
+          <ac:chgData name="Rhett Marchant" userId="18df2c221d5c7175" providerId="LiveId" clId="{7133A3CE-13BC-A846-BD39-2206C18E2A82}" dt="2024-05-20T03:14:33.332" v="48" actId="1076"/>
+          <ac:picMkLst>
+            <pc:docMk/>
+            <pc:sldMk cId="2871830996" sldId="258"/>
+            <ac:picMk id="6" creationId="{84F1C8E0-8EBC-5D67-C8AB-4C448E8A871D}"/>
+          </ac:picMkLst>
+        </pc:picChg>
+        <pc:picChg chg="add del mod">
+          <ac:chgData name="Rhett Marchant" userId="18df2c221d5c7175" providerId="LiveId" clId="{7133A3CE-13BC-A846-BD39-2206C18E2A82}" dt="2024-05-20T04:18:29.911" v="435" actId="21"/>
+          <ac:picMkLst>
+            <pc:docMk/>
+            <pc:sldMk cId="2871830996" sldId="258"/>
+            <ac:picMk id="10" creationId="{65F5C901-F34E-AF48-0C3C-3C0DCD4270F9}"/>
+          </ac:picMkLst>
+        </pc:picChg>
+      </pc:sldChg>
+      <pc:sldChg chg="addSp delSp modSp new mod ord">
+        <pc:chgData name="Rhett Marchant" userId="18df2c221d5c7175" providerId="LiveId" clId="{7133A3CE-13BC-A846-BD39-2206C18E2A82}" dt="2024-05-20T04:18:38.262" v="438" actId="20578"/>
+        <pc:sldMkLst>
+          <pc:docMk/>
+          <pc:sldMk cId="408511297" sldId="259"/>
+        </pc:sldMkLst>
+        <pc:spChg chg="del">
+          <ac:chgData name="Rhett Marchant" userId="18df2c221d5c7175" providerId="LiveId" clId="{7133A3CE-13BC-A846-BD39-2206C18E2A82}" dt="2024-05-20T03:24:36.904" v="83" actId="478"/>
+          <ac:spMkLst>
+            <pc:docMk/>
+            <pc:sldMk cId="408511297" sldId="259"/>
+            <ac:spMk id="2" creationId="{C2257D81-2BF8-FB19-0C93-4D3E5BD08620}"/>
+          </ac:spMkLst>
+        </pc:spChg>
+        <pc:spChg chg="del">
+          <ac:chgData name="Rhett Marchant" userId="18df2c221d5c7175" providerId="LiveId" clId="{7133A3CE-13BC-A846-BD39-2206C18E2A82}" dt="2024-05-20T03:24:23.916" v="76"/>
+          <ac:spMkLst>
+            <pc:docMk/>
+            <pc:sldMk cId="408511297" sldId="259"/>
+            <ac:spMk id="3" creationId="{2CDCFF5F-0C33-3D5E-3D68-BAC3225E3412}"/>
+          </ac:spMkLst>
+        </pc:spChg>
+        <pc:spChg chg="add mod">
+          <ac:chgData name="Rhett Marchant" userId="18df2c221d5c7175" providerId="LiveId" clId="{7133A3CE-13BC-A846-BD39-2206C18E2A82}" dt="2024-05-20T03:30:18.046" v="238" actId="20577"/>
+          <ac:spMkLst>
+            <pc:docMk/>
+            <pc:sldMk cId="408511297" sldId="259"/>
+            <ac:spMk id="8" creationId="{53252BE0-099E-B350-F738-0C0AC79FDAC3}"/>
+          </ac:spMkLst>
+        </pc:spChg>
+        <pc:spChg chg="add mod">
+          <ac:chgData name="Rhett Marchant" userId="18df2c221d5c7175" providerId="LiveId" clId="{7133A3CE-13BC-A846-BD39-2206C18E2A82}" dt="2024-05-20T03:34:34.059" v="429" actId="14100"/>
+          <ac:spMkLst>
+            <pc:docMk/>
+            <pc:sldMk cId="408511297" sldId="259"/>
+            <ac:spMk id="16" creationId="{FECC1E8D-5D8F-552D-2AAC-9AF804D7395D}"/>
+          </ac:spMkLst>
+        </pc:spChg>
+        <pc:spChg chg="add mod">
+          <ac:chgData name="Rhett Marchant" userId="18df2c221d5c7175" providerId="LiveId" clId="{7133A3CE-13BC-A846-BD39-2206C18E2A82}" dt="2024-05-20T03:34:48.377" v="433" actId="207"/>
+          <ac:spMkLst>
+            <pc:docMk/>
+            <pc:sldMk cId="408511297" sldId="259"/>
+            <ac:spMk id="17" creationId="{A2AC2BE3-C7E5-6FB7-3E24-0C3005F4EE6D}"/>
+          </ac:spMkLst>
+        </pc:spChg>
+        <pc:spChg chg="add mod">
+          <ac:chgData name="Rhett Marchant" userId="18df2c221d5c7175" providerId="LiveId" clId="{7133A3CE-13BC-A846-BD39-2206C18E2A82}" dt="2024-05-20T03:32:21.213" v="395" actId="207"/>
+          <ac:spMkLst>
+            <pc:docMk/>
+            <pc:sldMk cId="408511297" sldId="259"/>
+            <ac:spMk id="18" creationId="{12CA9864-137A-C4AE-C3CB-FF73126C9076}"/>
+          </ac:spMkLst>
+        </pc:spChg>
+        <pc:spChg chg="add mod">
+          <ac:chgData name="Rhett Marchant" userId="18df2c221d5c7175" providerId="LiveId" clId="{7133A3CE-13BC-A846-BD39-2206C18E2A82}" dt="2024-05-20T03:34:39.809" v="432" actId="1037"/>
+          <ac:spMkLst>
+            <pc:docMk/>
+            <pc:sldMk cId="408511297" sldId="259"/>
+            <ac:spMk id="19" creationId="{6470C9D4-A76A-30ED-9A73-2D56044BA88D}"/>
+          </ac:spMkLst>
+        </pc:spChg>
+        <pc:picChg chg="add mod">
+          <ac:chgData name="Rhett Marchant" userId="18df2c221d5c7175" providerId="LiveId" clId="{7133A3CE-13BC-A846-BD39-2206C18E2A82}" dt="2024-05-20T03:24:35.713" v="82" actId="1076"/>
+          <ac:picMkLst>
+            <pc:docMk/>
+            <pc:sldMk cId="408511297" sldId="259"/>
+            <ac:picMk id="5" creationId="{C2F34E1E-CE71-284D-50E7-D1B97B2B45E0}"/>
+          </ac:picMkLst>
+        </pc:picChg>
+        <pc:picChg chg="add mod modCrop">
+          <ac:chgData name="Rhett Marchant" userId="18df2c221d5c7175" providerId="LiveId" clId="{7133A3CE-13BC-A846-BD39-2206C18E2A82}" dt="2024-05-20T03:25:42.374" v="96" actId="1076"/>
+          <ac:picMkLst>
+            <pc:docMk/>
+            <pc:sldMk cId="408511297" sldId="259"/>
+            <ac:picMk id="7" creationId="{BE28BE97-868E-5E4B-11E1-6E1455A7598E}"/>
+          </ac:picMkLst>
+        </pc:picChg>
+        <pc:cxnChg chg="add mod">
+          <ac:chgData name="Rhett Marchant" userId="18df2c221d5c7175" providerId="LiveId" clId="{7133A3CE-13BC-A846-BD39-2206C18E2A82}" dt="2024-05-20T03:30:16.006" v="236" actId="20577"/>
+          <ac:cxnSpMkLst>
+            <pc:docMk/>
+            <pc:sldMk cId="408511297" sldId="259"/>
+            <ac:cxnSpMk id="10" creationId="{45970703-F4E9-CAC2-FAE3-0887078CEC71}"/>
+          </ac:cxnSpMkLst>
+        </pc:cxnChg>
+        <pc:cxnChg chg="add mod">
+          <ac:chgData name="Rhett Marchant" userId="18df2c221d5c7175" providerId="LiveId" clId="{7133A3CE-13BC-A846-BD39-2206C18E2A82}" dt="2024-05-20T03:30:16.006" v="236" actId="20577"/>
+          <ac:cxnSpMkLst>
+            <pc:docMk/>
+            <pc:sldMk cId="408511297" sldId="259"/>
+            <ac:cxnSpMk id="11" creationId="{49C75B10-B760-3051-DE71-11ED3B60B748}"/>
+          </ac:cxnSpMkLst>
+        </pc:cxnChg>
+      </pc:sldChg>
+      <pc:sldChg chg="addSp delSp modSp new del mod">
+        <pc:chgData name="Rhett Marchant" userId="18df2c221d5c7175" providerId="LiveId" clId="{7133A3CE-13BC-A846-BD39-2206C18E2A82}" dt="2024-05-20T04:43:29.317" v="608" actId="2696"/>
+        <pc:sldMkLst>
+          <pc:docMk/>
+          <pc:sldMk cId="1047290812" sldId="260"/>
+        </pc:sldMkLst>
+        <pc:spChg chg="mod">
+          <ac:chgData name="Rhett Marchant" userId="18df2c221d5c7175" providerId="LiveId" clId="{7133A3CE-13BC-A846-BD39-2206C18E2A82}" dt="2024-05-20T04:19:08.529" v="478" actId="20577"/>
+          <ac:spMkLst>
+            <pc:docMk/>
+            <pc:sldMk cId="1047290812" sldId="260"/>
+            <ac:spMk id="2" creationId="{07C28BBB-BA6C-725F-BCA7-8EF8F43D7849}"/>
+          </ac:spMkLst>
+        </pc:spChg>
+        <pc:spChg chg="del">
+          <ac:chgData name="Rhett Marchant" userId="18df2c221d5c7175" providerId="LiveId" clId="{7133A3CE-13BC-A846-BD39-2206C18E2A82}" dt="2024-05-20T04:18:40.455" v="439" actId="478"/>
+          <ac:spMkLst>
+            <pc:docMk/>
+            <pc:sldMk cId="1047290812" sldId="260"/>
+            <ac:spMk id="3" creationId="{1B5DE6BC-381A-D1E0-6050-1F0D2F47BE6F}"/>
+          </ac:spMkLst>
+        </pc:spChg>
+        <pc:spChg chg="add mod">
+          <ac:chgData name="Rhett Marchant" userId="18df2c221d5c7175" providerId="LiveId" clId="{7133A3CE-13BC-A846-BD39-2206C18E2A82}" dt="2024-05-20T04:19:28.830" v="485" actId="20577"/>
+          <ac:spMkLst>
+            <pc:docMk/>
+            <pc:sldMk cId="1047290812" sldId="260"/>
+            <ac:spMk id="5" creationId="{C2756C06-2EC9-A884-1598-534DEEFDCCD5}"/>
+          </ac:spMkLst>
+        </pc:spChg>
+        <pc:picChg chg="add mod modCrop">
+          <ac:chgData name="Rhett Marchant" userId="18df2c221d5c7175" providerId="LiveId" clId="{7133A3CE-13BC-A846-BD39-2206C18E2A82}" dt="2024-05-20T04:18:59.218" v="446" actId="732"/>
+          <ac:picMkLst>
+            <pc:docMk/>
+            <pc:sldMk cId="1047290812" sldId="260"/>
+            <ac:picMk id="4" creationId="{33218225-E1A8-AB9A-AA7F-FAEDB3ABFE2A}"/>
+          </ac:picMkLst>
+        </pc:picChg>
+      </pc:sldChg>
+      <pc:sldChg chg="addSp delSp modSp new mod">
+        <pc:chgData name="Rhett Marchant" userId="18df2c221d5c7175" providerId="LiveId" clId="{7133A3CE-13BC-A846-BD39-2206C18E2A82}" dt="2024-05-20T04:43:25.743" v="605"/>
+        <pc:sldMkLst>
+          <pc:docMk/>
+          <pc:sldMk cId="1104159419" sldId="261"/>
+        </pc:sldMkLst>
+        <pc:spChg chg="del">
+          <ac:chgData name="Rhett Marchant" userId="18df2c221d5c7175" providerId="LiveId" clId="{7133A3CE-13BC-A846-BD39-2206C18E2A82}" dt="2024-05-20T04:38:46.659" v="487" actId="478"/>
+          <ac:spMkLst>
+            <pc:docMk/>
+            <pc:sldMk cId="1104159419" sldId="261"/>
+            <ac:spMk id="2" creationId="{1BDA0010-FD4B-E974-0B9B-C9CC53EE3AE0}"/>
+          </ac:spMkLst>
+        </pc:spChg>
+        <pc:spChg chg="del">
+          <ac:chgData name="Rhett Marchant" userId="18df2c221d5c7175" providerId="LiveId" clId="{7133A3CE-13BC-A846-BD39-2206C18E2A82}" dt="2024-05-20T04:38:46.659" v="487" actId="478"/>
+          <ac:spMkLst>
+            <pc:docMk/>
+            <pc:sldMk cId="1104159419" sldId="261"/>
+            <ac:spMk id="3" creationId="{EABF79AA-E730-8A15-3E8F-AD18D89F27DD}"/>
+          </ac:spMkLst>
+        </pc:spChg>
+        <pc:spChg chg="add mod">
+          <ac:chgData name="Rhett Marchant" userId="18df2c221d5c7175" providerId="LiveId" clId="{7133A3CE-13BC-A846-BD39-2206C18E2A82}" dt="2024-05-20T04:43:10.714" v="602" actId="1076"/>
+          <ac:spMkLst>
+            <pc:docMk/>
+            <pc:sldMk cId="1104159419" sldId="261"/>
+            <ac:spMk id="8" creationId="{D48FF451-34B7-17FE-707F-CE2F8E05A2EA}"/>
+          </ac:spMkLst>
+        </pc:spChg>
+        <pc:spChg chg="add mod">
+          <ac:chgData name="Rhett Marchant" userId="18df2c221d5c7175" providerId="LiveId" clId="{7133A3CE-13BC-A846-BD39-2206C18E2A82}" dt="2024-05-20T04:43:25.743" v="605"/>
+          <ac:spMkLst>
+            <pc:docMk/>
+            <pc:sldMk cId="1104159419" sldId="261"/>
+            <ac:spMk id="9" creationId="{8126CFCC-8630-49DA-B170-16B9E0584762}"/>
+          </ac:spMkLst>
+        </pc:spChg>
+        <pc:picChg chg="add mod">
+          <ac:chgData name="Rhett Marchant" userId="18df2c221d5c7175" providerId="LiveId" clId="{7133A3CE-13BC-A846-BD39-2206C18E2A82}" dt="2024-05-20T04:43:10.714" v="602" actId="1076"/>
+          <ac:picMkLst>
+            <pc:docMk/>
+            <pc:sldMk cId="1104159419" sldId="261"/>
+            <ac:picMk id="5" creationId="{C0AD08F7-A6F9-A120-67E3-0FC360AAEA1C}"/>
+          </ac:picMkLst>
+        </pc:picChg>
+        <pc:picChg chg="add del mod modCrop">
+          <ac:chgData name="Rhett Marchant" userId="18df2c221d5c7175" providerId="LiveId" clId="{7133A3CE-13BC-A846-BD39-2206C18E2A82}" dt="2024-05-20T04:40:18.800" v="511" actId="478"/>
+          <ac:picMkLst>
+            <pc:docMk/>
+            <pc:sldMk cId="1104159419" sldId="261"/>
+            <ac:picMk id="7" creationId="{52CDC77C-EA13-1531-DF45-AD953E45C52E}"/>
+          </ac:picMkLst>
+        </pc:picChg>
+      </pc:sldChg>
+      <pc:sldChg chg="addSp delSp modSp add mod">
+        <pc:chgData name="Rhett Marchant" userId="18df2c221d5c7175" providerId="LiveId" clId="{7133A3CE-13BC-A846-BD39-2206C18E2A82}" dt="2024-05-20T04:43:52.582" v="609" actId="1076"/>
+        <pc:sldMkLst>
+          <pc:docMk/>
+          <pc:sldMk cId="2689905132" sldId="262"/>
+        </pc:sldMkLst>
+        <pc:spChg chg="add mod">
+          <ac:chgData name="Rhett Marchant" userId="18df2c221d5c7175" providerId="LiveId" clId="{7133A3CE-13BC-A846-BD39-2206C18E2A82}" dt="2024-05-20T04:43:52.582" v="609" actId="1076"/>
+          <ac:spMkLst>
+            <pc:docMk/>
+            <pc:sldMk cId="2689905132" sldId="262"/>
+            <ac:spMk id="2" creationId="{5C756413-71E5-5B31-50A9-03E0EA18B5B8}"/>
+          </ac:spMkLst>
+        </pc:spChg>
+        <pc:spChg chg="add mod">
+          <ac:chgData name="Rhett Marchant" userId="18df2c221d5c7175" providerId="LiveId" clId="{7133A3CE-13BC-A846-BD39-2206C18E2A82}" dt="2024-05-20T04:43:26.487" v="606"/>
+          <ac:spMkLst>
+            <pc:docMk/>
+            <pc:sldMk cId="2689905132" sldId="262"/>
+            <ac:spMk id="3" creationId="{65FBD6B1-47C1-AC12-7F48-08E3B0349419}"/>
+          </ac:spMkLst>
+        </pc:spChg>
+        <pc:picChg chg="del">
+          <ac:chgData name="Rhett Marchant" userId="18df2c221d5c7175" providerId="LiveId" clId="{7133A3CE-13BC-A846-BD39-2206C18E2A82}" dt="2024-05-20T04:40:29.557" v="513" actId="478"/>
+          <ac:picMkLst>
+            <pc:docMk/>
+            <pc:sldMk cId="2689905132" sldId="262"/>
+            <ac:picMk id="5" creationId="{C0AD08F7-A6F9-A120-67E3-0FC360AAEA1C}"/>
+          </ac:picMkLst>
+        </pc:picChg>
+        <pc:picChg chg="mod">
+          <ac:chgData name="Rhett Marchant" userId="18df2c221d5c7175" providerId="LiveId" clId="{7133A3CE-13BC-A846-BD39-2206C18E2A82}" dt="2024-05-20T04:43:52.582" v="609" actId="1076"/>
+          <ac:picMkLst>
+            <pc:docMk/>
+            <pc:sldMk cId="2689905132" sldId="262"/>
+            <ac:picMk id="7" creationId="{52CDC77C-EA13-1531-DF45-AD953E45C52E}"/>
+          </ac:picMkLst>
+        </pc:picChg>
+      </pc:sldChg>
+      <pc:sldChg chg="addSp delSp modSp add mod">
+        <pc:chgData name="Rhett Marchant" userId="18df2c221d5c7175" providerId="LiveId" clId="{7133A3CE-13BC-A846-BD39-2206C18E2A82}" dt="2024-05-20T04:43:27.184" v="607"/>
+        <pc:sldMkLst>
+          <pc:docMk/>
+          <pc:sldMk cId="16592388" sldId="263"/>
+        </pc:sldMkLst>
+        <pc:spChg chg="add mod">
+          <ac:chgData name="Rhett Marchant" userId="18df2c221d5c7175" providerId="LiveId" clId="{7133A3CE-13BC-A846-BD39-2206C18E2A82}" dt="2024-05-20T04:43:22.040" v="604" actId="1076"/>
+          <ac:spMkLst>
+            <pc:docMk/>
+            <pc:sldMk cId="16592388" sldId="263"/>
+            <ac:spMk id="4" creationId="{06ADAE92-B156-B2CF-2357-565C16DEF4C2}"/>
+          </ac:spMkLst>
+        </pc:spChg>
+        <pc:spChg chg="add mod">
+          <ac:chgData name="Rhett Marchant" userId="18df2c221d5c7175" providerId="LiveId" clId="{7133A3CE-13BC-A846-BD39-2206C18E2A82}" dt="2024-05-20T04:43:27.184" v="607"/>
+          <ac:spMkLst>
+            <pc:docMk/>
+            <pc:sldMk cId="16592388" sldId="263"/>
+            <ac:spMk id="5" creationId="{453BF132-965B-EBB2-0039-AA86EB68072F}"/>
+          </ac:spMkLst>
+        </pc:spChg>
+        <pc:picChg chg="add mod modCrop">
+          <ac:chgData name="Rhett Marchant" userId="18df2c221d5c7175" providerId="LiveId" clId="{7133A3CE-13BC-A846-BD39-2206C18E2A82}" dt="2024-05-20T04:43:22.040" v="604" actId="1076"/>
+          <ac:picMkLst>
+            <pc:docMk/>
+            <pc:sldMk cId="16592388" sldId="263"/>
+            <ac:picMk id="3" creationId="{A74F5748-48D3-FC8A-7C70-DE1AE42825C1}"/>
+          </ac:picMkLst>
+        </pc:picChg>
+        <pc:picChg chg="del">
+          <ac:chgData name="Rhett Marchant" userId="18df2c221d5c7175" providerId="LiveId" clId="{7133A3CE-13BC-A846-BD39-2206C18E2A82}" dt="2024-05-20T04:41:45.453" v="531" actId="478"/>
+          <ac:picMkLst>
+            <pc:docMk/>
+            <pc:sldMk cId="16592388" sldId="263"/>
+            <ac:picMk id="7" creationId="{52CDC77C-EA13-1531-DF45-AD953E45C52E}"/>
+          </ac:picMkLst>
+        </pc:picChg>
+      </pc:sldChg>
+    </pc:docChg>
+  </pc:docChgLst>
+</pc:chgInfo>
 </file>
 
 <file path=ppt/slideLayouts/slideLayout1.xml><?xml version="1.0" encoding="utf-8"?>
@@ -257,7 +619,7 @@
           <a:p>
             <a:fld id="{3EF31678-6B82-5B4B-834D-D2CBD0B9CFEC}" type="datetimeFigureOut">
               <a:rPr lang="en-US" smtClean="0"/>
-              <a:t>4/23/24</a:t>
+              <a:t>5/20/24</a:t>
             </a:fld>
             <a:endParaRPr lang="en-US"/>
           </a:p>
@@ -457,7 +819,7 @@
           <a:p>
             <a:fld id="{3EF31678-6B82-5B4B-834D-D2CBD0B9CFEC}" type="datetimeFigureOut">
               <a:rPr lang="en-US" smtClean="0"/>
-              <a:t>4/23/24</a:t>
+              <a:t>5/20/24</a:t>
             </a:fld>
             <a:endParaRPr lang="en-US"/>
           </a:p>
@@ -667,7 +1029,7 @@
           <a:p>
             <a:fld id="{3EF31678-6B82-5B4B-834D-D2CBD0B9CFEC}" type="datetimeFigureOut">
               <a:rPr lang="en-US" smtClean="0"/>
-              <a:t>4/23/24</a:t>
+              <a:t>5/20/24</a:t>
             </a:fld>
             <a:endParaRPr lang="en-US"/>
           </a:p>
@@ -867,7 +1229,7 @@
           <a:p>
             <a:fld id="{3EF31678-6B82-5B4B-834D-D2CBD0B9CFEC}" type="datetimeFigureOut">
               <a:rPr lang="en-US" smtClean="0"/>
-              <a:t>4/23/24</a:t>
+              <a:t>5/20/24</a:t>
             </a:fld>
             <a:endParaRPr lang="en-US"/>
           </a:p>
@@ -1143,7 +1505,7 @@
           <a:p>
             <a:fld id="{3EF31678-6B82-5B4B-834D-D2CBD0B9CFEC}" type="datetimeFigureOut">
               <a:rPr lang="en-US" smtClean="0"/>
-              <a:t>4/23/24</a:t>
+              <a:t>5/20/24</a:t>
             </a:fld>
             <a:endParaRPr lang="en-US"/>
           </a:p>
@@ -1411,7 +1773,7 @@
           <a:p>
             <a:fld id="{3EF31678-6B82-5B4B-834D-D2CBD0B9CFEC}" type="datetimeFigureOut">
               <a:rPr lang="en-US" smtClean="0"/>
-              <a:t>4/23/24</a:t>
+              <a:t>5/20/24</a:t>
             </a:fld>
             <a:endParaRPr lang="en-US"/>
           </a:p>
@@ -1826,7 +2188,7 @@
           <a:p>
             <a:fld id="{3EF31678-6B82-5B4B-834D-D2CBD0B9CFEC}" type="datetimeFigureOut">
               <a:rPr lang="en-US" smtClean="0"/>
-              <a:t>4/23/24</a:t>
+              <a:t>5/20/24</a:t>
             </a:fld>
             <a:endParaRPr lang="en-US"/>
           </a:p>
@@ -1968,7 +2330,7 @@
           <a:p>
             <a:fld id="{3EF31678-6B82-5B4B-834D-D2CBD0B9CFEC}" type="datetimeFigureOut">
               <a:rPr lang="en-US" smtClean="0"/>
-              <a:t>4/23/24</a:t>
+              <a:t>5/20/24</a:t>
             </a:fld>
             <a:endParaRPr lang="en-US"/>
           </a:p>
@@ -2081,7 +2443,7 @@
           <a:p>
             <a:fld id="{3EF31678-6B82-5B4B-834D-D2CBD0B9CFEC}" type="datetimeFigureOut">
               <a:rPr lang="en-US" smtClean="0"/>
-              <a:t>4/23/24</a:t>
+              <a:t>5/20/24</a:t>
             </a:fld>
             <a:endParaRPr lang="en-US"/>
           </a:p>
@@ -2394,7 +2756,7 @@
           <a:p>
             <a:fld id="{3EF31678-6B82-5B4B-834D-D2CBD0B9CFEC}" type="datetimeFigureOut">
               <a:rPr lang="en-US" smtClean="0"/>
-              <a:t>4/23/24</a:t>
+              <a:t>5/20/24</a:t>
             </a:fld>
             <a:endParaRPr lang="en-US"/>
           </a:p>
@@ -2683,7 +3045,7 @@
           <a:p>
             <a:fld id="{3EF31678-6B82-5B4B-834D-D2CBD0B9CFEC}" type="datetimeFigureOut">
               <a:rPr lang="en-US" smtClean="0"/>
-              <a:t>4/23/24</a:t>
+              <a:t>5/20/24</a:t>
             </a:fld>
             <a:endParaRPr lang="en-US"/>
           </a:p>
@@ -2926,7 +3288,7 @@
           <a:p>
             <a:fld id="{3EF31678-6B82-5B4B-834D-D2CBD0B9CFEC}" type="datetimeFigureOut">
               <a:rPr lang="en-US" smtClean="0"/>
-              <a:t>4/23/24</a:t>
+              <a:t>5/20/24</a:t>
             </a:fld>
             <a:endParaRPr lang="en-US"/>
           </a:p>
@@ -3510,6 +3872,964 @@
     <p:extLst>
       <p:ext uri="{BB962C8B-B14F-4D97-AF65-F5344CB8AC3E}">
         <p14:creationId xmlns:p14="http://schemas.microsoft.com/office/powerpoint/2010/main" val="1867753254"/>
+      </p:ext>
+    </p:extLst>
+  </p:cSld>
+  <p:clrMapOvr>
+    <a:masterClrMapping/>
+  </p:clrMapOvr>
+</p:sld>
+</file>
+
+<file path=ppt/slides/slide3.xml><?xml version="1.0" encoding="utf-8"?>
+<p:sld xmlns:a="http://schemas.openxmlformats.org/drawingml/2006/main" xmlns:r="http://schemas.openxmlformats.org/officeDocument/2006/relationships" xmlns:p="http://schemas.openxmlformats.org/presentationml/2006/main">
+  <p:cSld>
+    <p:spTree>
+      <p:nvGrpSpPr>
+        <p:cNvPr id="1" name=""/>
+        <p:cNvGrpSpPr/>
+        <p:nvPr/>
+      </p:nvGrpSpPr>
+      <p:grpSpPr>
+        <a:xfrm>
+          <a:off x="0" y="0"/>
+          <a:ext cx="0" cy="0"/>
+          <a:chOff x="0" y="0"/>
+          <a:chExt cx="0" cy="0"/>
+        </a:xfrm>
+      </p:grpSpPr>
+      <p:pic>
+        <p:nvPicPr>
+          <p:cNvPr id="5" name="Content Placeholder 4" descr="A screenshot of a computer&#10;&#10;Description automatically generated">
+            <a:extLst>
+              <a:ext uri="{FF2B5EF4-FFF2-40B4-BE49-F238E27FC236}">
+                <a16:creationId xmlns:a16="http://schemas.microsoft.com/office/drawing/2014/main" id="{C2F34E1E-CE71-284D-50E7-D1B97B2B45E0}"/>
+              </a:ext>
+            </a:extLst>
+          </p:cNvPr>
+          <p:cNvPicPr>
+            <a:picLocks noGrp="1" noChangeAspect="1"/>
+          </p:cNvPicPr>
+          <p:nvPr>
+            <p:ph idx="1"/>
+          </p:nvPr>
+        </p:nvPicPr>
+        <p:blipFill>
+          <a:blip r:embed="rId2"/>
+          <a:stretch>
+            <a:fillRect/>
+          </a:stretch>
+        </p:blipFill>
+        <p:spPr>
+          <a:xfrm>
+            <a:off x="161554" y="1169409"/>
+            <a:ext cx="11868892" cy="5688591"/>
+          </a:xfrm>
+        </p:spPr>
+      </p:pic>
+      <p:pic>
+        <p:nvPicPr>
+          <p:cNvPr id="7" name="Picture 6">
+            <a:extLst>
+              <a:ext uri="{FF2B5EF4-FFF2-40B4-BE49-F238E27FC236}">
+                <a16:creationId xmlns:a16="http://schemas.microsoft.com/office/drawing/2014/main" id="{BE28BE97-868E-5E4B-11E1-6E1455A7598E}"/>
+              </a:ext>
+            </a:extLst>
+          </p:cNvPr>
+          <p:cNvPicPr>
+            <a:picLocks noChangeAspect="1"/>
+          </p:cNvPicPr>
+          <p:nvPr/>
+        </p:nvPicPr>
+        <p:blipFill rotWithShape="1">
+          <a:blip r:embed="rId3"/>
+          <a:srcRect l="1760" r="30323" b="10365"/>
+          <a:stretch/>
+        </p:blipFill>
+        <p:spPr>
+          <a:xfrm>
+            <a:off x="171553" y="255682"/>
+            <a:ext cx="11848893" cy="821278"/>
+          </a:xfrm>
+          <a:prstGeom prst="rect">
+            <a:avLst/>
+          </a:prstGeom>
+        </p:spPr>
+      </p:pic>
+      <p:sp>
+        <p:nvSpPr>
+          <p:cNvPr id="8" name="TextBox 7">
+            <a:extLst>
+              <a:ext uri="{FF2B5EF4-FFF2-40B4-BE49-F238E27FC236}">
+                <a16:creationId xmlns:a16="http://schemas.microsoft.com/office/drawing/2014/main" id="{53252BE0-099E-B350-F738-0C0AC79FDAC3}"/>
+              </a:ext>
+            </a:extLst>
+          </p:cNvPr>
+          <p:cNvSpPr txBox="1"/>
+          <p:nvPr/>
+        </p:nvSpPr>
+        <p:spPr>
+          <a:xfrm>
+            <a:off x="2838175" y="2204720"/>
+            <a:ext cx="6583021" cy="369332"/>
+          </a:xfrm>
+          <a:prstGeom prst="rect">
+            <a:avLst/>
+          </a:prstGeom>
+          <a:solidFill>
+            <a:schemeClr val="bg1"/>
+          </a:solidFill>
+        </p:spPr>
+        <p:txBody>
+          <a:bodyPr wrap="none" rtlCol="0">
+            <a:spAutoFit/>
+          </a:bodyPr>
+          <a:lstStyle/>
+          <a:p>
+            <a:r>
+              <a:rPr lang="en-US" dirty="0" err="1"/>
+              <a:t>Exonic</a:t>
+            </a:r>
+            <a:r>
+              <a:rPr lang="en-US" dirty="0"/>
+              <a:t> donor (takes final exon G) and intronic acceptor (new AG)</a:t>
+            </a:r>
+          </a:p>
+        </p:txBody>
+      </p:sp>
+      <p:cxnSp>
+        <p:nvCxnSpPr>
+          <p:cNvPr id="10" name="Straight Arrow Connector 9">
+            <a:extLst>
+              <a:ext uri="{FF2B5EF4-FFF2-40B4-BE49-F238E27FC236}">
+                <a16:creationId xmlns:a16="http://schemas.microsoft.com/office/drawing/2014/main" id="{45970703-F4E9-CAC2-FAE3-0887078CEC71}"/>
+              </a:ext>
+            </a:extLst>
+          </p:cNvPr>
+          <p:cNvCxnSpPr>
+            <a:cxnSpLocks/>
+            <a:stCxn id="8" idx="3"/>
+          </p:cNvCxnSpPr>
+          <p:nvPr/>
+        </p:nvCxnSpPr>
+        <p:spPr>
+          <a:xfrm>
+            <a:off x="9421196" y="2389386"/>
+            <a:ext cx="677844" cy="0"/>
+          </a:xfrm>
+          <a:prstGeom prst="straightConnector1">
+            <a:avLst/>
+          </a:prstGeom>
+          <a:ln w="38100">
+            <a:solidFill>
+              <a:srgbClr val="FF0000"/>
+            </a:solidFill>
+            <a:tailEnd type="triangle"/>
+          </a:ln>
+        </p:spPr>
+        <p:style>
+          <a:lnRef idx="2">
+            <a:schemeClr val="accent1"/>
+          </a:lnRef>
+          <a:fillRef idx="0">
+            <a:schemeClr val="accent1"/>
+          </a:fillRef>
+          <a:effectRef idx="1">
+            <a:schemeClr val="accent1"/>
+          </a:effectRef>
+          <a:fontRef idx="minor">
+            <a:schemeClr val="tx1"/>
+          </a:fontRef>
+        </p:style>
+      </p:cxnSp>
+      <p:cxnSp>
+        <p:nvCxnSpPr>
+          <p:cNvPr id="11" name="Straight Arrow Connector 10">
+            <a:extLst>
+              <a:ext uri="{FF2B5EF4-FFF2-40B4-BE49-F238E27FC236}">
+                <a16:creationId xmlns:a16="http://schemas.microsoft.com/office/drawing/2014/main" id="{49C75B10-B760-3051-DE71-11ED3B60B748}"/>
+              </a:ext>
+            </a:extLst>
+          </p:cNvPr>
+          <p:cNvCxnSpPr>
+            <a:cxnSpLocks/>
+            <a:stCxn id="8" idx="1"/>
+          </p:cNvCxnSpPr>
+          <p:nvPr/>
+        </p:nvCxnSpPr>
+        <p:spPr>
+          <a:xfrm flipH="1">
+            <a:off x="2258609" y="2389386"/>
+            <a:ext cx="579566" cy="1786"/>
+          </a:xfrm>
+          <a:prstGeom prst="straightConnector1">
+            <a:avLst/>
+          </a:prstGeom>
+          <a:ln w="38100">
+            <a:solidFill>
+              <a:srgbClr val="FF0000"/>
+            </a:solidFill>
+            <a:tailEnd type="triangle"/>
+          </a:ln>
+        </p:spPr>
+        <p:style>
+          <a:lnRef idx="2">
+            <a:schemeClr val="accent1"/>
+          </a:lnRef>
+          <a:fillRef idx="0">
+            <a:schemeClr val="accent1"/>
+          </a:fillRef>
+          <a:effectRef idx="1">
+            <a:schemeClr val="accent1"/>
+          </a:effectRef>
+          <a:fontRef idx="minor">
+            <a:schemeClr val="tx1"/>
+          </a:fontRef>
+        </p:style>
+      </p:cxnSp>
+      <p:sp>
+        <p:nvSpPr>
+          <p:cNvPr id="16" name="TextBox 15">
+            <a:extLst>
+              <a:ext uri="{FF2B5EF4-FFF2-40B4-BE49-F238E27FC236}">
+                <a16:creationId xmlns:a16="http://schemas.microsoft.com/office/drawing/2014/main" id="{FECC1E8D-5D8F-552D-2AAC-9AF804D7395D}"/>
+              </a:ext>
+            </a:extLst>
+          </p:cNvPr>
+          <p:cNvSpPr txBox="1"/>
+          <p:nvPr/>
+        </p:nvSpPr>
+        <p:spPr>
+          <a:xfrm>
+            <a:off x="1352601" y="4100162"/>
+            <a:ext cx="974039" cy="369332"/>
+          </a:xfrm>
+          <a:prstGeom prst="rect">
+            <a:avLst/>
+          </a:prstGeom>
+          <a:solidFill>
+            <a:schemeClr val="bg1">
+              <a:alpha val="60000"/>
+            </a:schemeClr>
+          </a:solidFill>
+        </p:spPr>
+        <p:txBody>
+          <a:bodyPr wrap="square" rtlCol="0">
+            <a:spAutoFit/>
+          </a:bodyPr>
+          <a:lstStyle/>
+          <a:p>
+            <a:pPr algn="ctr"/>
+            <a:r>
+              <a:rPr lang="en-US" dirty="0"/>
+              <a:t>GCCAG</a:t>
+            </a:r>
+          </a:p>
+        </p:txBody>
+      </p:sp>
+      <p:sp>
+        <p:nvSpPr>
+          <p:cNvPr id="17" name="TextBox 16">
+            <a:extLst>
+              <a:ext uri="{FF2B5EF4-FFF2-40B4-BE49-F238E27FC236}">
+                <a16:creationId xmlns:a16="http://schemas.microsoft.com/office/drawing/2014/main" id="{A2AC2BE3-C7E5-6FB7-3E24-0C3005F4EE6D}"/>
+              </a:ext>
+            </a:extLst>
+          </p:cNvPr>
+          <p:cNvSpPr txBox="1"/>
+          <p:nvPr/>
+        </p:nvSpPr>
+        <p:spPr>
+          <a:xfrm>
+            <a:off x="9895841" y="3096005"/>
+            <a:ext cx="1300480" cy="369332"/>
+          </a:xfrm>
+          <a:prstGeom prst="rect">
+            <a:avLst/>
+          </a:prstGeom>
+          <a:solidFill>
+            <a:schemeClr val="bg1">
+              <a:alpha val="60000"/>
+            </a:schemeClr>
+          </a:solidFill>
+        </p:spPr>
+        <p:txBody>
+          <a:bodyPr wrap="square" rtlCol="0">
+            <a:spAutoFit/>
+          </a:bodyPr>
+          <a:lstStyle/>
+          <a:p>
+            <a:r>
+              <a:rPr lang="en-US" dirty="0" err="1"/>
+              <a:t>t</a:t>
+            </a:r>
+            <a:r>
+              <a:rPr lang="en-US" dirty="0" err="1">
+                <a:solidFill>
+                  <a:srgbClr val="FF0000"/>
+                </a:solidFill>
+              </a:rPr>
+              <a:t>aG</a:t>
+            </a:r>
+            <a:r>
+              <a:rPr lang="en-US" dirty="0" err="1"/>
+              <a:t>CCAG</a:t>
+            </a:r>
+            <a:endParaRPr lang="en-US" dirty="0"/>
+          </a:p>
+        </p:txBody>
+      </p:sp>
+      <p:sp>
+        <p:nvSpPr>
+          <p:cNvPr id="18" name="TextBox 17">
+            <a:extLst>
+              <a:ext uri="{FF2B5EF4-FFF2-40B4-BE49-F238E27FC236}">
+                <a16:creationId xmlns:a16="http://schemas.microsoft.com/office/drawing/2014/main" id="{12CA9864-137A-C4AE-C3CB-FF73126C9076}"/>
+              </a:ext>
+            </a:extLst>
+          </p:cNvPr>
+          <p:cNvSpPr txBox="1"/>
+          <p:nvPr/>
+        </p:nvSpPr>
+        <p:spPr>
+          <a:xfrm>
+            <a:off x="10373361" y="4091348"/>
+            <a:ext cx="1463040" cy="369332"/>
+          </a:xfrm>
+          <a:prstGeom prst="rect">
+            <a:avLst/>
+          </a:prstGeom>
+          <a:solidFill>
+            <a:schemeClr val="bg1">
+              <a:alpha val="60000"/>
+            </a:schemeClr>
+          </a:solidFill>
+        </p:spPr>
+        <p:txBody>
+          <a:bodyPr wrap="square" rtlCol="0">
+            <a:spAutoFit/>
+          </a:bodyPr>
+          <a:lstStyle/>
+          <a:p>
+            <a:r>
+              <a:rPr lang="en-US" dirty="0" err="1"/>
+              <a:t>cagGTATG</a:t>
+            </a:r>
+            <a:endParaRPr lang="en-US" dirty="0"/>
+          </a:p>
+        </p:txBody>
+      </p:sp>
+      <p:sp>
+        <p:nvSpPr>
+          <p:cNvPr id="19" name="TextBox 18">
+            <a:extLst>
+              <a:ext uri="{FF2B5EF4-FFF2-40B4-BE49-F238E27FC236}">
+                <a16:creationId xmlns:a16="http://schemas.microsoft.com/office/drawing/2014/main" id="{6470C9D4-A76A-30ED-9A73-2D56044BA88D}"/>
+              </a:ext>
+            </a:extLst>
+          </p:cNvPr>
+          <p:cNvSpPr txBox="1"/>
+          <p:nvPr/>
+        </p:nvSpPr>
+        <p:spPr>
+          <a:xfrm>
+            <a:off x="1474521" y="3125708"/>
+            <a:ext cx="831799" cy="369332"/>
+          </a:xfrm>
+          <a:prstGeom prst="rect">
+            <a:avLst/>
+          </a:prstGeom>
+          <a:solidFill>
+            <a:schemeClr val="bg1">
+              <a:alpha val="60000"/>
+            </a:schemeClr>
+          </a:solidFill>
+        </p:spPr>
+        <p:txBody>
+          <a:bodyPr wrap="square" rtlCol="0">
+            <a:spAutoFit/>
+          </a:bodyPr>
+          <a:lstStyle/>
+          <a:p>
+            <a:pPr algn="ctr"/>
+            <a:r>
+              <a:rPr lang="en-US" dirty="0"/>
+              <a:t>GCCA</a:t>
+            </a:r>
+          </a:p>
+        </p:txBody>
+      </p:sp>
+    </p:spTree>
+    <p:extLst>
+      <p:ext uri="{BB962C8B-B14F-4D97-AF65-F5344CB8AC3E}">
+        <p14:creationId xmlns:p14="http://schemas.microsoft.com/office/powerpoint/2010/main" val="408511297"/>
+      </p:ext>
+    </p:extLst>
+  </p:cSld>
+  <p:clrMapOvr>
+    <a:masterClrMapping/>
+  </p:clrMapOvr>
+</p:sld>
+</file>
+
+<file path=ppt/slides/slide4.xml><?xml version="1.0" encoding="utf-8"?>
+<p:sld xmlns:a="http://schemas.openxmlformats.org/drawingml/2006/main" xmlns:r="http://schemas.openxmlformats.org/officeDocument/2006/relationships" xmlns:p="http://schemas.openxmlformats.org/presentationml/2006/main">
+  <p:cSld>
+    <p:spTree>
+      <p:nvGrpSpPr>
+        <p:cNvPr id="1" name=""/>
+        <p:cNvGrpSpPr/>
+        <p:nvPr/>
+      </p:nvGrpSpPr>
+      <p:grpSpPr>
+        <a:xfrm>
+          <a:off x="0" y="0"/>
+          <a:ext cx="0" cy="0"/>
+          <a:chOff x="0" y="0"/>
+          <a:chExt cx="0" cy="0"/>
+        </a:xfrm>
+      </p:grpSpPr>
+      <p:sp>
+        <p:nvSpPr>
+          <p:cNvPr id="2" name="Title 1">
+            <a:extLst>
+              <a:ext uri="{FF2B5EF4-FFF2-40B4-BE49-F238E27FC236}">
+                <a16:creationId xmlns:a16="http://schemas.microsoft.com/office/drawing/2014/main" id="{249115FB-225B-60BD-2028-785633E8564D}"/>
+              </a:ext>
+            </a:extLst>
+          </p:cNvPr>
+          <p:cNvSpPr>
+            <a:spLocks noGrp="1"/>
+          </p:cNvSpPr>
+          <p:nvPr>
+            <p:ph type="title"/>
+          </p:nvPr>
+        </p:nvSpPr>
+        <p:spPr/>
+        <p:txBody>
+          <a:bodyPr/>
+          <a:lstStyle/>
+          <a:p>
+            <a:r>
+              <a:rPr lang="en-US" i="1" dirty="0"/>
+              <a:t>GALT</a:t>
+            </a:r>
+          </a:p>
+        </p:txBody>
+      </p:sp>
+      <p:pic>
+        <p:nvPicPr>
+          <p:cNvPr id="5" name="Content Placeholder 4" descr="A screenshot of a graph&#10;&#10;Description automatically generated">
+            <a:extLst>
+              <a:ext uri="{FF2B5EF4-FFF2-40B4-BE49-F238E27FC236}">
+                <a16:creationId xmlns:a16="http://schemas.microsoft.com/office/drawing/2014/main" id="{BE882182-287A-DF7D-7FBF-290B152372A8}"/>
+              </a:ext>
+            </a:extLst>
+          </p:cNvPr>
+          <p:cNvPicPr>
+            <a:picLocks noGrp="1" noChangeAspect="1"/>
+          </p:cNvPicPr>
+          <p:nvPr>
+            <p:ph idx="1"/>
+          </p:nvPr>
+        </p:nvPicPr>
+        <p:blipFill rotWithShape="1">
+          <a:blip r:embed="rId2"/>
+          <a:srcRect l="1053" t="55249" r="1882" b="2208"/>
+          <a:stretch/>
+        </p:blipFill>
+        <p:spPr>
+          <a:xfrm>
+            <a:off x="304800" y="4460875"/>
+            <a:ext cx="11409680" cy="2153920"/>
+          </a:xfrm>
+        </p:spPr>
+      </p:pic>
+      <p:pic>
+        <p:nvPicPr>
+          <p:cNvPr id="6" name="Content Placeholder 4" descr="A screenshot of a graph&#10;&#10;Description automatically generated">
+            <a:extLst>
+              <a:ext uri="{FF2B5EF4-FFF2-40B4-BE49-F238E27FC236}">
+                <a16:creationId xmlns:a16="http://schemas.microsoft.com/office/drawing/2014/main" id="{84F1C8E0-8EBC-5D67-C8AB-4C448E8A871D}"/>
+              </a:ext>
+            </a:extLst>
+          </p:cNvPr>
+          <p:cNvPicPr>
+            <a:picLocks noChangeAspect="1"/>
+          </p:cNvPicPr>
+          <p:nvPr/>
+        </p:nvPicPr>
+        <p:blipFill rotWithShape="1">
+          <a:blip r:embed="rId2"/>
+          <a:srcRect l="1053" t="1869" r="8537" b="55588"/>
+          <a:stretch/>
+        </p:blipFill>
+        <p:spPr>
+          <a:xfrm>
+            <a:off x="304800" y="1788795"/>
+            <a:ext cx="10627360" cy="2153919"/>
+          </a:xfrm>
+          <a:prstGeom prst="rect">
+            <a:avLst/>
+          </a:prstGeom>
+        </p:spPr>
+      </p:pic>
+      <p:sp>
+        <p:nvSpPr>
+          <p:cNvPr id="7" name="TextBox 6">
+            <a:extLst>
+              <a:ext uri="{FF2B5EF4-FFF2-40B4-BE49-F238E27FC236}">
+                <a16:creationId xmlns:a16="http://schemas.microsoft.com/office/drawing/2014/main" id="{6D3E756C-8855-57B2-AAB6-68D3885C2710}"/>
+              </a:ext>
+            </a:extLst>
+          </p:cNvPr>
+          <p:cNvSpPr txBox="1"/>
+          <p:nvPr/>
+        </p:nvSpPr>
+        <p:spPr>
+          <a:xfrm>
+            <a:off x="304800" y="1392554"/>
+            <a:ext cx="2122697" cy="369332"/>
+          </a:xfrm>
+          <a:prstGeom prst="rect">
+            <a:avLst/>
+          </a:prstGeom>
+          <a:noFill/>
+        </p:spPr>
+        <p:txBody>
+          <a:bodyPr wrap="none" rtlCol="0">
+            <a:spAutoFit/>
+          </a:bodyPr>
+          <a:lstStyle/>
+          <a:p>
+            <a:r>
+              <a:rPr lang="en-US" dirty="0"/>
+              <a:t>Junctions Identified</a:t>
+            </a:r>
+          </a:p>
+        </p:txBody>
+      </p:sp>
+      <p:sp>
+        <p:nvSpPr>
+          <p:cNvPr id="8" name="TextBox 7">
+            <a:extLst>
+              <a:ext uri="{FF2B5EF4-FFF2-40B4-BE49-F238E27FC236}">
+                <a16:creationId xmlns:a16="http://schemas.microsoft.com/office/drawing/2014/main" id="{60E3A48F-E9C7-57C6-3EDC-D4D2D75D7EB0}"/>
+              </a:ext>
+            </a:extLst>
+          </p:cNvPr>
+          <p:cNvSpPr txBox="1"/>
+          <p:nvPr/>
+        </p:nvSpPr>
+        <p:spPr>
+          <a:xfrm>
+            <a:off x="304799" y="4132974"/>
+            <a:ext cx="2069797" cy="369332"/>
+          </a:xfrm>
+          <a:prstGeom prst="rect">
+            <a:avLst/>
+          </a:prstGeom>
+          <a:noFill/>
+        </p:spPr>
+        <p:txBody>
+          <a:bodyPr wrap="none" rtlCol="0">
+            <a:spAutoFit/>
+          </a:bodyPr>
+          <a:lstStyle/>
+          <a:p>
+            <a:r>
+              <a:rPr lang="en-US" dirty="0"/>
+              <a:t>Reads per Junction</a:t>
+            </a:r>
+          </a:p>
+        </p:txBody>
+      </p:sp>
+    </p:spTree>
+    <p:extLst>
+      <p:ext uri="{BB962C8B-B14F-4D97-AF65-F5344CB8AC3E}">
+        <p14:creationId xmlns:p14="http://schemas.microsoft.com/office/powerpoint/2010/main" val="2871830996"/>
+      </p:ext>
+    </p:extLst>
+  </p:cSld>
+  <p:clrMapOvr>
+    <a:masterClrMapping/>
+  </p:clrMapOvr>
+</p:sld>
+</file>
+
+<file path=ppt/slides/slide5.xml><?xml version="1.0" encoding="utf-8"?>
+<p:sld xmlns:a="http://schemas.openxmlformats.org/drawingml/2006/main" xmlns:r="http://schemas.openxmlformats.org/officeDocument/2006/relationships" xmlns:p="http://schemas.openxmlformats.org/presentationml/2006/main">
+  <p:cSld>
+    <p:spTree>
+      <p:nvGrpSpPr>
+        <p:cNvPr id="1" name=""/>
+        <p:cNvGrpSpPr/>
+        <p:nvPr/>
+      </p:nvGrpSpPr>
+      <p:grpSpPr>
+        <a:xfrm>
+          <a:off x="0" y="0"/>
+          <a:ext cx="0" cy="0"/>
+          <a:chOff x="0" y="0"/>
+          <a:chExt cx="0" cy="0"/>
+        </a:xfrm>
+      </p:grpSpPr>
+      <p:pic>
+        <p:nvPicPr>
+          <p:cNvPr id="5" name="Picture 4" descr="A pie chart with many colors&#10;&#10;Description automatically generated">
+            <a:extLst>
+              <a:ext uri="{FF2B5EF4-FFF2-40B4-BE49-F238E27FC236}">
+                <a16:creationId xmlns:a16="http://schemas.microsoft.com/office/drawing/2014/main" id="{C0AD08F7-A6F9-A120-67E3-0FC360AAEA1C}"/>
+              </a:ext>
+            </a:extLst>
+          </p:cNvPr>
+          <p:cNvPicPr>
+            <a:picLocks noChangeAspect="1"/>
+          </p:cNvPicPr>
+          <p:nvPr/>
+        </p:nvPicPr>
+        <p:blipFill>
+          <a:blip r:embed="rId2"/>
+          <a:stretch>
+            <a:fillRect/>
+          </a:stretch>
+        </p:blipFill>
+        <p:spPr>
+          <a:xfrm>
+            <a:off x="273050" y="1937751"/>
+            <a:ext cx="11645900" cy="4587778"/>
+          </a:xfrm>
+          <a:prstGeom prst="rect">
+            <a:avLst/>
+          </a:prstGeom>
+        </p:spPr>
+      </p:pic>
+      <p:sp>
+        <p:nvSpPr>
+          <p:cNvPr id="8" name="TextBox 7">
+            <a:extLst>
+              <a:ext uri="{FF2B5EF4-FFF2-40B4-BE49-F238E27FC236}">
+                <a16:creationId xmlns:a16="http://schemas.microsoft.com/office/drawing/2014/main" id="{D48FF451-34B7-17FE-707F-CE2F8E05A2EA}"/>
+              </a:ext>
+            </a:extLst>
+          </p:cNvPr>
+          <p:cNvSpPr txBox="1"/>
+          <p:nvPr/>
+        </p:nvSpPr>
+        <p:spPr>
+          <a:xfrm>
+            <a:off x="345440" y="1568419"/>
+            <a:ext cx="2424062" cy="369332"/>
+          </a:xfrm>
+          <a:prstGeom prst="rect">
+            <a:avLst/>
+          </a:prstGeom>
+          <a:noFill/>
+        </p:spPr>
+        <p:txBody>
+          <a:bodyPr wrap="none" rtlCol="0">
+            <a:spAutoFit/>
+          </a:bodyPr>
+          <a:lstStyle/>
+          <a:p>
+            <a:r>
+              <a:rPr lang="en-US" dirty="0"/>
+              <a:t>All Junctions Identified</a:t>
+            </a:r>
+          </a:p>
+        </p:txBody>
+      </p:sp>
+      <p:sp>
+        <p:nvSpPr>
+          <p:cNvPr id="9" name="Title 1">
+            <a:extLst>
+              <a:ext uri="{FF2B5EF4-FFF2-40B4-BE49-F238E27FC236}">
+                <a16:creationId xmlns:a16="http://schemas.microsoft.com/office/drawing/2014/main" id="{8126CFCC-8630-49DA-B170-16B9E0584762}"/>
+              </a:ext>
+            </a:extLst>
+          </p:cNvPr>
+          <p:cNvSpPr>
+            <a:spLocks noGrp="1"/>
+          </p:cNvSpPr>
+          <p:nvPr>
+            <p:ph type="title"/>
+          </p:nvPr>
+        </p:nvSpPr>
+        <p:spPr>
+          <a:xfrm>
+            <a:off x="838200" y="365125"/>
+            <a:ext cx="10515600" cy="1325563"/>
+          </a:xfrm>
+        </p:spPr>
+        <p:txBody>
+          <a:bodyPr/>
+          <a:lstStyle/>
+          <a:p>
+            <a:r>
+              <a:rPr lang="en-US" dirty="0"/>
+              <a:t>FRASER for Family IK</a:t>
+            </a:r>
+          </a:p>
+        </p:txBody>
+      </p:sp>
+    </p:spTree>
+    <p:extLst>
+      <p:ext uri="{BB962C8B-B14F-4D97-AF65-F5344CB8AC3E}">
+        <p14:creationId xmlns:p14="http://schemas.microsoft.com/office/powerpoint/2010/main" val="1104159419"/>
+      </p:ext>
+    </p:extLst>
+  </p:cSld>
+  <p:clrMapOvr>
+    <a:masterClrMapping/>
+  </p:clrMapOvr>
+</p:sld>
+</file>
+
+<file path=ppt/slides/slide6.xml><?xml version="1.0" encoding="utf-8"?>
+<p:sld xmlns:a="http://schemas.openxmlformats.org/drawingml/2006/main" xmlns:r="http://schemas.openxmlformats.org/officeDocument/2006/relationships" xmlns:p="http://schemas.openxmlformats.org/presentationml/2006/main">
+  <p:cSld>
+    <p:spTree>
+      <p:nvGrpSpPr>
+        <p:cNvPr id="1" name=""/>
+        <p:cNvGrpSpPr/>
+        <p:nvPr/>
+      </p:nvGrpSpPr>
+      <p:grpSpPr>
+        <a:xfrm>
+          <a:off x="0" y="0"/>
+          <a:ext cx="0" cy="0"/>
+          <a:chOff x="0" y="0"/>
+          <a:chExt cx="0" cy="0"/>
+        </a:xfrm>
+      </p:grpSpPr>
+      <p:pic>
+        <p:nvPicPr>
+          <p:cNvPr id="7" name="Picture 6" descr="A pie chart with many colors&#10;&#10;Description automatically generated">
+            <a:extLst>
+              <a:ext uri="{FF2B5EF4-FFF2-40B4-BE49-F238E27FC236}">
+                <a16:creationId xmlns:a16="http://schemas.microsoft.com/office/drawing/2014/main" id="{52CDC77C-EA13-1531-DF45-AD953E45C52E}"/>
+              </a:ext>
+            </a:extLst>
+          </p:cNvPr>
+          <p:cNvPicPr>
+            <a:picLocks noChangeAspect="1"/>
+          </p:cNvPicPr>
+          <p:nvPr/>
+        </p:nvPicPr>
+        <p:blipFill rotWithShape="1">
+          <a:blip r:embed="rId2"/>
+          <a:srcRect l="630" t="1611" r="1270" b="2719"/>
+          <a:stretch/>
+        </p:blipFill>
+        <p:spPr>
+          <a:xfrm>
+            <a:off x="273050" y="1960417"/>
+            <a:ext cx="11645900" cy="4532458"/>
+          </a:xfrm>
+          <a:prstGeom prst="rect">
+            <a:avLst/>
+          </a:prstGeom>
+        </p:spPr>
+      </p:pic>
+      <p:sp>
+        <p:nvSpPr>
+          <p:cNvPr id="2" name="TextBox 1">
+            <a:extLst>
+              <a:ext uri="{FF2B5EF4-FFF2-40B4-BE49-F238E27FC236}">
+                <a16:creationId xmlns:a16="http://schemas.microsoft.com/office/drawing/2014/main" id="{5C756413-71E5-5B31-50A9-03E0EA18B5B8}"/>
+              </a:ext>
+            </a:extLst>
+          </p:cNvPr>
+          <p:cNvSpPr txBox="1"/>
+          <p:nvPr/>
+        </p:nvSpPr>
+        <p:spPr>
+          <a:xfrm>
+            <a:off x="345440" y="1563425"/>
+            <a:ext cx="5765937" cy="369332"/>
+          </a:xfrm>
+          <a:prstGeom prst="rect">
+            <a:avLst/>
+          </a:prstGeom>
+          <a:noFill/>
+        </p:spPr>
+        <p:txBody>
+          <a:bodyPr wrap="none" rtlCol="0">
+            <a:spAutoFit/>
+          </a:bodyPr>
+          <a:lstStyle/>
+          <a:p>
+            <a:r>
+              <a:rPr lang="en-US" dirty="0"/>
+              <a:t>All Significant Junctions Identified (not adjusted for FDR)</a:t>
+            </a:r>
+          </a:p>
+        </p:txBody>
+      </p:sp>
+      <p:sp>
+        <p:nvSpPr>
+          <p:cNvPr id="3" name="Title 1">
+            <a:extLst>
+              <a:ext uri="{FF2B5EF4-FFF2-40B4-BE49-F238E27FC236}">
+                <a16:creationId xmlns:a16="http://schemas.microsoft.com/office/drawing/2014/main" id="{65FBD6B1-47C1-AC12-7F48-08E3B0349419}"/>
+              </a:ext>
+            </a:extLst>
+          </p:cNvPr>
+          <p:cNvSpPr>
+            <a:spLocks noGrp="1"/>
+          </p:cNvSpPr>
+          <p:nvPr>
+            <p:ph type="title"/>
+          </p:nvPr>
+        </p:nvSpPr>
+        <p:spPr>
+          <a:xfrm>
+            <a:off x="838200" y="365125"/>
+            <a:ext cx="10515600" cy="1325563"/>
+          </a:xfrm>
+        </p:spPr>
+        <p:txBody>
+          <a:bodyPr/>
+          <a:lstStyle/>
+          <a:p>
+            <a:r>
+              <a:rPr lang="en-US" dirty="0"/>
+              <a:t>FRASER for Family IK</a:t>
+            </a:r>
+          </a:p>
+        </p:txBody>
+      </p:sp>
+    </p:spTree>
+    <p:extLst>
+      <p:ext uri="{BB962C8B-B14F-4D97-AF65-F5344CB8AC3E}">
+        <p14:creationId xmlns:p14="http://schemas.microsoft.com/office/powerpoint/2010/main" val="2689905132"/>
+      </p:ext>
+    </p:extLst>
+  </p:cSld>
+  <p:clrMapOvr>
+    <a:masterClrMapping/>
+  </p:clrMapOvr>
+</p:sld>
+</file>
+
+<file path=ppt/slides/slide7.xml><?xml version="1.0" encoding="utf-8"?>
+<p:sld xmlns:a="http://schemas.openxmlformats.org/drawingml/2006/main" xmlns:r="http://schemas.openxmlformats.org/officeDocument/2006/relationships" xmlns:p="http://schemas.openxmlformats.org/presentationml/2006/main">
+  <p:cSld>
+    <p:spTree>
+      <p:nvGrpSpPr>
+        <p:cNvPr id="1" name=""/>
+        <p:cNvGrpSpPr/>
+        <p:nvPr/>
+      </p:nvGrpSpPr>
+      <p:grpSpPr>
+        <a:xfrm>
+          <a:off x="0" y="0"/>
+          <a:ext cx="0" cy="0"/>
+          <a:chOff x="0" y="0"/>
+          <a:chExt cx="0" cy="0"/>
+        </a:xfrm>
+      </p:grpSpPr>
+      <p:pic>
+        <p:nvPicPr>
+          <p:cNvPr id="3" name="Picture 2" descr="A pie chart with many colors&#10;&#10;Description automatically generated">
+            <a:extLst>
+              <a:ext uri="{FF2B5EF4-FFF2-40B4-BE49-F238E27FC236}">
+                <a16:creationId xmlns:a16="http://schemas.microsoft.com/office/drawing/2014/main" id="{A74F5748-48D3-FC8A-7C70-DE1AE42825C1}"/>
+              </a:ext>
+            </a:extLst>
+          </p:cNvPr>
+          <p:cNvPicPr>
+            <a:picLocks noChangeAspect="1"/>
+          </p:cNvPicPr>
+          <p:nvPr/>
+        </p:nvPicPr>
+        <p:blipFill rotWithShape="1">
+          <a:blip r:embed="rId2"/>
+          <a:srcRect l="616" t="-1" r="963" b="1520"/>
+          <a:stretch/>
+        </p:blipFill>
+        <p:spPr>
+          <a:xfrm>
+            <a:off x="273050" y="1946749"/>
+            <a:ext cx="11645900" cy="4636932"/>
+          </a:xfrm>
+          <a:prstGeom prst="rect">
+            <a:avLst/>
+          </a:prstGeom>
+        </p:spPr>
+      </p:pic>
+      <p:sp>
+        <p:nvSpPr>
+          <p:cNvPr id="4" name="TextBox 3">
+            <a:extLst>
+              <a:ext uri="{FF2B5EF4-FFF2-40B4-BE49-F238E27FC236}">
+                <a16:creationId xmlns:a16="http://schemas.microsoft.com/office/drawing/2014/main" id="{06ADAE92-B156-B2CF-2357-565C16DEF4C2}"/>
+              </a:ext>
+            </a:extLst>
+          </p:cNvPr>
+          <p:cNvSpPr txBox="1"/>
+          <p:nvPr/>
+        </p:nvSpPr>
+        <p:spPr>
+          <a:xfrm>
+            <a:off x="345440" y="1578579"/>
+            <a:ext cx="5353389" cy="369332"/>
+          </a:xfrm>
+          <a:prstGeom prst="rect">
+            <a:avLst/>
+          </a:prstGeom>
+          <a:noFill/>
+        </p:spPr>
+        <p:txBody>
+          <a:bodyPr wrap="none" rtlCol="0">
+            <a:spAutoFit/>
+          </a:bodyPr>
+          <a:lstStyle/>
+          <a:p>
+            <a:r>
+              <a:rPr lang="en-US" dirty="0"/>
+              <a:t>All Significant Junctions Identified (adjusted for FDR)</a:t>
+            </a:r>
+          </a:p>
+        </p:txBody>
+      </p:sp>
+      <p:sp>
+        <p:nvSpPr>
+          <p:cNvPr id="5" name="Title 1">
+            <a:extLst>
+              <a:ext uri="{FF2B5EF4-FFF2-40B4-BE49-F238E27FC236}">
+                <a16:creationId xmlns:a16="http://schemas.microsoft.com/office/drawing/2014/main" id="{453BF132-965B-EBB2-0039-AA86EB68072F}"/>
+              </a:ext>
+            </a:extLst>
+          </p:cNvPr>
+          <p:cNvSpPr>
+            <a:spLocks noGrp="1"/>
+          </p:cNvSpPr>
+          <p:nvPr>
+            <p:ph type="title"/>
+          </p:nvPr>
+        </p:nvSpPr>
+        <p:spPr>
+          <a:xfrm>
+            <a:off x="838200" y="365125"/>
+            <a:ext cx="10515600" cy="1325563"/>
+          </a:xfrm>
+        </p:spPr>
+        <p:txBody>
+          <a:bodyPr/>
+          <a:lstStyle/>
+          <a:p>
+            <a:r>
+              <a:rPr lang="en-US" dirty="0"/>
+              <a:t>FRASER for Family IK</a:t>
+            </a:r>
+          </a:p>
+        </p:txBody>
+      </p:sp>
+    </p:spTree>
+    <p:extLst>
+      <p:ext uri="{BB962C8B-B14F-4D97-AF65-F5344CB8AC3E}">
+        <p14:creationId xmlns:p14="http://schemas.microsoft.com/office/powerpoint/2010/main" val="16592388"/>
       </p:ext>
     </p:extLst>
   </p:cSld>

</xml_diff>

<commit_message>
add tx to output
</commit_message>
<xml_diff>
--- a/docs/splice-event-annotation.pptx
+++ b/docs/splice-event-annotation.pptx
@@ -8,12 +8,13 @@
     <p:sldId id="256" r:id="rId2"/>
     <p:sldId id="257" r:id="rId3"/>
     <p:sldId id="259" r:id="rId4"/>
-    <p:sldId id="262" r:id="rId5"/>
-    <p:sldId id="258" r:id="rId6"/>
-    <p:sldId id="260" r:id="rId7"/>
-    <p:sldId id="264" r:id="rId8"/>
-    <p:sldId id="263" r:id="rId9"/>
-    <p:sldId id="261" r:id="rId10"/>
+    <p:sldId id="265" r:id="rId5"/>
+    <p:sldId id="262" r:id="rId6"/>
+    <p:sldId id="258" r:id="rId7"/>
+    <p:sldId id="260" r:id="rId8"/>
+    <p:sldId id="264" r:id="rId9"/>
+    <p:sldId id="263" r:id="rId10"/>
+    <p:sldId id="261" r:id="rId11"/>
   </p:sldIdLst>
   <p:sldSz cx="12192000" cy="6858000"/>
   <p:notesSz cx="6858000" cy="9144000"/>
@@ -123,7 +124,7 @@
 <file path=ppt/revisionInfo.xml><?xml version="1.0" encoding="utf-8"?>
 <p1510:revInfo xmlns:a="http://schemas.openxmlformats.org/drawingml/2006/main" xmlns:r="http://schemas.openxmlformats.org/officeDocument/2006/relationships" xmlns:p1510="http://schemas.microsoft.com/office/powerpoint/2015/10/main">
   <p1510:revLst>
-    <p1510:client id="{7133A3CE-13BC-A846-BD39-2206C18E2A82}" v="38" dt="2024-05-21T02:58:04.074"/>
+    <p1510:client id="{7133A3CE-13BC-A846-BD39-2206C18E2A82}" v="52" dt="2024-05-30T23:51:00.175"/>
   </p1510:revLst>
 </p1510:revInfo>
 </file>
@@ -133,12 +134,12 @@
   <pc:docChgLst>
     <pc:chgData name="Rhett Marchant" userId="18df2c221d5c7175" providerId="LiveId" clId="{7133A3CE-13BC-A846-BD39-2206C18E2A82}"/>
     <pc:docChg chg="undo custSel addSld delSld modSld sldOrd">
-      <pc:chgData name="Rhett Marchant" userId="18df2c221d5c7175" providerId="LiveId" clId="{7133A3CE-13BC-A846-BD39-2206C18E2A82}" dt="2024-05-21T03:02:43.139" v="1551" actId="2162"/>
+      <pc:chgData name="Rhett Marchant" userId="18df2c221d5c7175" providerId="LiveId" clId="{7133A3CE-13BC-A846-BD39-2206C18E2A82}" dt="2024-05-30T23:51:00.175" v="1596"/>
       <pc:docMkLst>
         <pc:docMk/>
       </pc:docMkLst>
-      <pc:sldChg chg="addSp delSp modSp mod">
-        <pc:chgData name="Rhett Marchant" userId="18df2c221d5c7175" providerId="LiveId" clId="{7133A3CE-13BC-A846-BD39-2206C18E2A82}" dt="2024-05-21T02:35:16.701" v="635" actId="122"/>
+      <pc:sldChg chg="addSp delSp modSp mod modAnim">
+        <pc:chgData name="Rhett Marchant" userId="18df2c221d5c7175" providerId="LiveId" clId="{7133A3CE-13BC-A846-BD39-2206C18E2A82}" dt="2024-05-30T23:50:27.882" v="1588"/>
         <pc:sldMkLst>
           <pc:docMk/>
           <pc:sldMk cId="1867753254" sldId="257"/>
@@ -248,7 +249,7 @@
           </ac:spMkLst>
         </pc:spChg>
         <pc:spChg chg="add mod">
-          <ac:chgData name="Rhett Marchant" userId="18df2c221d5c7175" providerId="LiveId" clId="{7133A3CE-13BC-A846-BD39-2206C18E2A82}" dt="2024-05-21T02:28:59.115" v="353" actId="1076"/>
+          <ac:chgData name="Rhett Marchant" userId="18df2c221d5c7175" providerId="LiveId" clId="{7133A3CE-13BC-A846-BD39-2206C18E2A82}" dt="2024-05-30T23:42:18.903" v="1554" actId="20577"/>
           <ac:spMkLst>
             <pc:docMk/>
             <pc:sldMk cId="1867753254" sldId="257"/>
@@ -256,7 +257,7 @@
           </ac:spMkLst>
         </pc:spChg>
         <pc:spChg chg="add mod">
-          <ac:chgData name="Rhett Marchant" userId="18df2c221d5c7175" providerId="LiveId" clId="{7133A3CE-13BC-A846-BD39-2206C18E2A82}" dt="2024-05-21T02:29:53.016" v="455" actId="1076"/>
+          <ac:chgData name="Rhett Marchant" userId="18df2c221d5c7175" providerId="LiveId" clId="{7133A3CE-13BC-A846-BD39-2206C18E2A82}" dt="2024-05-30T23:42:21.862" v="1557" actId="20577"/>
           <ac:spMkLst>
             <pc:docMk/>
             <pc:sldMk cId="1867753254" sldId="257"/>
@@ -264,7 +265,7 @@
           </ac:spMkLst>
         </pc:spChg>
         <pc:spChg chg="add mod">
-          <ac:chgData name="Rhett Marchant" userId="18df2c221d5c7175" providerId="LiveId" clId="{7133A3CE-13BC-A846-BD39-2206C18E2A82}" dt="2024-05-21T02:30:42.078" v="564" actId="1076"/>
+          <ac:chgData name="Rhett Marchant" userId="18df2c221d5c7175" providerId="LiveId" clId="{7133A3CE-13BC-A846-BD39-2206C18E2A82}" dt="2024-05-30T23:42:27.064" v="1561" actId="20577"/>
           <ac:spMkLst>
             <pc:docMk/>
             <pc:sldMk cId="1867753254" sldId="257"/>
@@ -311,8 +312,8 @@
             <ac:inkMk id="26" creationId="{B26D2BA2-CF90-9AA1-8B21-31A176792F71}"/>
           </ac:inkMkLst>
         </pc:inkChg>
-        <pc:inkChg chg="add">
-          <ac:chgData name="Rhett Marchant" userId="18df2c221d5c7175" providerId="LiveId" clId="{7133A3CE-13BC-A846-BD39-2206C18E2A82}" dt="2024-05-21T02:32:45.596" v="624" actId="9405"/>
+        <pc:inkChg chg="add mod">
+          <ac:chgData name="Rhett Marchant" userId="18df2c221d5c7175" providerId="LiveId" clId="{7133A3CE-13BC-A846-BD39-2206C18E2A82}" dt="2024-05-30T23:50:18.580" v="1586" actId="1076"/>
           <ac:inkMkLst>
             <pc:docMk/>
             <pc:sldMk cId="1867753254" sldId="257"/>
@@ -328,8 +329,8 @@
           </ac:cxnSpMkLst>
         </pc:cxnChg>
       </pc:sldChg>
-      <pc:sldChg chg="addSp delSp modSp new mod">
-        <pc:chgData name="Rhett Marchant" userId="18df2c221d5c7175" providerId="LiveId" clId="{7133A3CE-13BC-A846-BD39-2206C18E2A82}" dt="2024-05-21T02:54:21.543" v="1173" actId="1076"/>
+      <pc:sldChg chg="addSp delSp modSp new mod modAnim">
+        <pc:chgData name="Rhett Marchant" userId="18df2c221d5c7175" providerId="LiveId" clId="{7133A3CE-13BC-A846-BD39-2206C18E2A82}" dt="2024-05-30T23:51:00.175" v="1596"/>
         <pc:sldMkLst>
           <pc:docMk/>
           <pc:sldMk cId="3249732208" sldId="258"/>
@@ -375,8 +376,8 @@
           </ac:picMkLst>
         </pc:picChg>
       </pc:sldChg>
-      <pc:sldChg chg="addSp delSp modSp new mod ord">
-        <pc:chgData name="Rhett Marchant" userId="18df2c221d5c7175" providerId="LiveId" clId="{7133A3CE-13BC-A846-BD39-2206C18E2A82}" dt="2024-05-21T02:50:40.418" v="1086" actId="207"/>
+      <pc:sldChg chg="addSp delSp modSp new mod ord modAnim">
+        <pc:chgData name="Rhett Marchant" userId="18df2c221d5c7175" providerId="LiveId" clId="{7133A3CE-13BC-A846-BD39-2206C18E2A82}" dt="2024-05-30T23:50:50.855" v="1595"/>
         <pc:sldMkLst>
           <pc:docMk/>
           <pc:sldMk cId="2336898673" sldId="259"/>
@@ -582,7 +583,7 @@
         </pc:picChg>
       </pc:sldChg>
       <pc:sldChg chg="modSp new mod">
-        <pc:chgData name="Rhett Marchant" userId="18df2c221d5c7175" providerId="LiveId" clId="{7133A3CE-13BC-A846-BD39-2206C18E2A82}" dt="2024-05-21T02:57:00.808" v="1304" actId="20577"/>
+        <pc:chgData name="Rhett Marchant" userId="18df2c221d5c7175" providerId="LiveId" clId="{7133A3CE-13BC-A846-BD39-2206C18E2A82}" dt="2024-05-30T23:42:58.069" v="1568" actId="20577"/>
         <pc:sldMkLst>
           <pc:docMk/>
           <pc:sldMk cId="601041608" sldId="261"/>
@@ -596,7 +597,7 @@
           </ac:spMkLst>
         </pc:spChg>
         <pc:spChg chg="mod">
-          <ac:chgData name="Rhett Marchant" userId="18df2c221d5c7175" providerId="LiveId" clId="{7133A3CE-13BC-A846-BD39-2206C18E2A82}" dt="2024-05-21T02:57:00.808" v="1304" actId="20577"/>
+          <ac:chgData name="Rhett Marchant" userId="18df2c221d5c7175" providerId="LiveId" clId="{7133A3CE-13BC-A846-BD39-2206C18E2A82}" dt="2024-05-30T23:42:58.069" v="1568" actId="20577"/>
           <ac:spMkLst>
             <pc:docMk/>
             <pc:sldMk cId="601041608" sldId="261"/>
@@ -824,6 +825,149 @@
           </ac:picMkLst>
         </pc:picChg>
       </pc:sldChg>
+      <pc:sldChg chg="addSp delSp modSp add mod">
+        <pc:chgData name="Rhett Marchant" userId="18df2c221d5c7175" providerId="LiveId" clId="{7133A3CE-13BC-A846-BD39-2206C18E2A82}" dt="2024-05-30T23:49:08.987" v="1581" actId="1076"/>
+        <pc:sldMkLst>
+          <pc:docMk/>
+          <pc:sldMk cId="426165249" sldId="265"/>
+        </pc:sldMkLst>
+        <pc:spChg chg="del">
+          <ac:chgData name="Rhett Marchant" userId="18df2c221d5c7175" providerId="LiveId" clId="{7133A3CE-13BC-A846-BD39-2206C18E2A82}" dt="2024-05-30T23:49:02.108" v="1577" actId="478"/>
+          <ac:spMkLst>
+            <pc:docMk/>
+            <pc:sldMk cId="426165249" sldId="265"/>
+            <ac:spMk id="2" creationId="{14B7B3DA-1DB1-8A64-6B4B-1BE65489421E}"/>
+          </ac:spMkLst>
+        </pc:spChg>
+        <pc:spChg chg="del">
+          <ac:chgData name="Rhett Marchant" userId="18df2c221d5c7175" providerId="LiveId" clId="{7133A3CE-13BC-A846-BD39-2206C18E2A82}" dt="2024-05-30T23:48:30.501" v="1570" actId="478"/>
+          <ac:spMkLst>
+            <pc:docMk/>
+            <pc:sldMk cId="426165249" sldId="265"/>
+            <ac:spMk id="5" creationId="{942BFAA8-5E46-FA16-C7CF-6DF5EA08D4A5}"/>
+          </ac:spMkLst>
+        </pc:spChg>
+        <pc:spChg chg="del">
+          <ac:chgData name="Rhett Marchant" userId="18df2c221d5c7175" providerId="LiveId" clId="{7133A3CE-13BC-A846-BD39-2206C18E2A82}" dt="2024-05-30T23:48:30.501" v="1570" actId="478"/>
+          <ac:spMkLst>
+            <pc:docMk/>
+            <pc:sldMk cId="426165249" sldId="265"/>
+            <ac:spMk id="7" creationId="{1C0822A9-BFC0-31D0-BC55-E0E6466614AB}"/>
+          </ac:spMkLst>
+        </pc:spChg>
+        <pc:spChg chg="del">
+          <ac:chgData name="Rhett Marchant" userId="18df2c221d5c7175" providerId="LiveId" clId="{7133A3CE-13BC-A846-BD39-2206C18E2A82}" dt="2024-05-30T23:48:30.501" v="1570" actId="478"/>
+          <ac:spMkLst>
+            <pc:docMk/>
+            <pc:sldMk cId="426165249" sldId="265"/>
+            <ac:spMk id="8" creationId="{5A3096A0-23D6-5F4D-F26D-919B0A207EA4}"/>
+          </ac:spMkLst>
+        </pc:spChg>
+        <pc:spChg chg="del">
+          <ac:chgData name="Rhett Marchant" userId="18df2c221d5c7175" providerId="LiveId" clId="{7133A3CE-13BC-A846-BD39-2206C18E2A82}" dt="2024-05-30T23:48:30.501" v="1570" actId="478"/>
+          <ac:spMkLst>
+            <pc:docMk/>
+            <pc:sldMk cId="426165249" sldId="265"/>
+            <ac:spMk id="9" creationId="{DCD8607F-FF3A-85FC-5CBC-398D802B9D4A}"/>
+          </ac:spMkLst>
+        </pc:spChg>
+        <pc:spChg chg="del">
+          <ac:chgData name="Rhett Marchant" userId="18df2c221d5c7175" providerId="LiveId" clId="{7133A3CE-13BC-A846-BD39-2206C18E2A82}" dt="2024-05-30T23:48:30.501" v="1570" actId="478"/>
+          <ac:spMkLst>
+            <pc:docMk/>
+            <pc:sldMk cId="426165249" sldId="265"/>
+            <ac:spMk id="10" creationId="{5F316266-D8F9-6AFF-710D-E1DA5E5FA021}"/>
+          </ac:spMkLst>
+        </pc:spChg>
+        <pc:spChg chg="add del mod">
+          <ac:chgData name="Rhett Marchant" userId="18df2c221d5c7175" providerId="LiveId" clId="{7133A3CE-13BC-A846-BD39-2206C18E2A82}" dt="2024-05-30T23:49:03.720" v="1578" actId="478"/>
+          <ac:spMkLst>
+            <pc:docMk/>
+            <pc:sldMk cId="426165249" sldId="265"/>
+            <ac:spMk id="13" creationId="{9CB2B2E5-0ACC-EEF7-1B60-4EFB0B5C35EC}"/>
+          </ac:spMkLst>
+        </pc:spChg>
+        <pc:spChg chg="del">
+          <ac:chgData name="Rhett Marchant" userId="18df2c221d5c7175" providerId="LiveId" clId="{7133A3CE-13BC-A846-BD39-2206C18E2A82}" dt="2024-05-30T23:48:30.501" v="1570" actId="478"/>
+          <ac:spMkLst>
+            <pc:docMk/>
+            <pc:sldMk cId="426165249" sldId="265"/>
+            <ac:spMk id="14" creationId="{B8C34AC0-56E1-F052-D729-09F2C930E065}"/>
+          </ac:spMkLst>
+        </pc:spChg>
+        <pc:spChg chg="del">
+          <ac:chgData name="Rhett Marchant" userId="18df2c221d5c7175" providerId="LiveId" clId="{7133A3CE-13BC-A846-BD39-2206C18E2A82}" dt="2024-05-30T23:48:30.501" v="1570" actId="478"/>
+          <ac:spMkLst>
+            <pc:docMk/>
+            <pc:sldMk cId="426165249" sldId="265"/>
+            <ac:spMk id="15" creationId="{0B1442AC-0D72-A728-9841-B3F4CE52ADDC}"/>
+          </ac:spMkLst>
+        </pc:spChg>
+        <pc:spChg chg="del">
+          <ac:chgData name="Rhett Marchant" userId="18df2c221d5c7175" providerId="LiveId" clId="{7133A3CE-13BC-A846-BD39-2206C18E2A82}" dt="2024-05-30T23:48:30.501" v="1570" actId="478"/>
+          <ac:spMkLst>
+            <pc:docMk/>
+            <pc:sldMk cId="426165249" sldId="265"/>
+            <ac:spMk id="16" creationId="{8FFE7A39-33F3-4601-0559-2521AD0E1D6F}"/>
+          </ac:spMkLst>
+        </pc:spChg>
+        <pc:spChg chg="del">
+          <ac:chgData name="Rhett Marchant" userId="18df2c221d5c7175" providerId="LiveId" clId="{7133A3CE-13BC-A846-BD39-2206C18E2A82}" dt="2024-05-30T23:48:30.501" v="1570" actId="478"/>
+          <ac:spMkLst>
+            <pc:docMk/>
+            <pc:sldMk cId="426165249" sldId="265"/>
+            <ac:spMk id="17" creationId="{E8EE128E-03BD-39A6-6BF0-7776B6A27FFC}"/>
+          </ac:spMkLst>
+        </pc:spChg>
+        <pc:spChg chg="del">
+          <ac:chgData name="Rhett Marchant" userId="18df2c221d5c7175" providerId="LiveId" clId="{7133A3CE-13BC-A846-BD39-2206C18E2A82}" dt="2024-05-30T23:48:30.501" v="1570" actId="478"/>
+          <ac:spMkLst>
+            <pc:docMk/>
+            <pc:sldMk cId="426165249" sldId="265"/>
+            <ac:spMk id="18" creationId="{EBC9CA0A-979D-795B-0B2E-6BB062A57924}"/>
+          </ac:spMkLst>
+        </pc:spChg>
+        <pc:spChg chg="del">
+          <ac:chgData name="Rhett Marchant" userId="18df2c221d5c7175" providerId="LiveId" clId="{7133A3CE-13BC-A846-BD39-2206C18E2A82}" dt="2024-05-30T23:48:30.501" v="1570" actId="478"/>
+          <ac:spMkLst>
+            <pc:docMk/>
+            <pc:sldMk cId="426165249" sldId="265"/>
+            <ac:spMk id="19" creationId="{0017A7AD-A7C8-07AE-A45E-2F9E7CF35487}"/>
+          </ac:spMkLst>
+        </pc:spChg>
+        <pc:spChg chg="del">
+          <ac:chgData name="Rhett Marchant" userId="18df2c221d5c7175" providerId="LiveId" clId="{7133A3CE-13BC-A846-BD39-2206C18E2A82}" dt="2024-05-30T23:48:30.501" v="1570" actId="478"/>
+          <ac:spMkLst>
+            <pc:docMk/>
+            <pc:sldMk cId="426165249" sldId="265"/>
+            <ac:spMk id="21" creationId="{F1E7E86B-6E8B-4BF7-09AD-8DD5FF562ED6}"/>
+          </ac:spMkLst>
+        </pc:spChg>
+        <pc:picChg chg="add mod">
+          <ac:chgData name="Rhett Marchant" userId="18df2c221d5c7175" providerId="LiveId" clId="{7133A3CE-13BC-A846-BD39-2206C18E2A82}" dt="2024-05-30T23:49:08.987" v="1581" actId="1076"/>
+          <ac:picMkLst>
+            <pc:docMk/>
+            <pc:sldMk cId="426165249" sldId="265"/>
+            <ac:picMk id="4" creationId="{1014A864-B3B3-5380-0D49-D27BA40F769B}"/>
+          </ac:picMkLst>
+        </pc:picChg>
+        <pc:picChg chg="del">
+          <ac:chgData name="Rhett Marchant" userId="18df2c221d5c7175" providerId="LiveId" clId="{7133A3CE-13BC-A846-BD39-2206C18E2A82}" dt="2024-05-30T23:48:30.501" v="1570" actId="478"/>
+          <ac:picMkLst>
+            <pc:docMk/>
+            <pc:sldMk cId="426165249" sldId="265"/>
+            <ac:picMk id="6" creationId="{9F66B1FC-7CAA-1C21-9CF0-1053666FB0DD}"/>
+          </ac:picMkLst>
+        </pc:picChg>
+        <pc:cxnChg chg="del mod">
+          <ac:chgData name="Rhett Marchant" userId="18df2c221d5c7175" providerId="LiveId" clId="{7133A3CE-13BC-A846-BD39-2206C18E2A82}" dt="2024-05-30T23:48:30.501" v="1570" actId="478"/>
+          <ac:cxnSpMkLst>
+            <pc:docMk/>
+            <pc:sldMk cId="426165249" sldId="265"/>
+            <ac:cxnSpMk id="11" creationId="{AFD62BE5-4085-DBE1-645E-9AF868CEC19E}"/>
+          </ac:cxnSpMkLst>
+        </pc:cxnChg>
+      </pc:sldChg>
       <pc:sldChg chg="new del">
         <pc:chgData name="Rhett Marchant" userId="18df2c221d5c7175" providerId="LiveId" clId="{7133A3CE-13BC-A846-BD39-2206C18E2A82}" dt="2024-05-21T03:00:43.184" v="1522" actId="2696"/>
         <pc:sldMkLst>
@@ -1041,7 +1185,7 @@
           <a:p>
             <a:fld id="{3EF31678-6B82-5B4B-834D-D2CBD0B9CFEC}" type="datetimeFigureOut">
               <a:rPr lang="en-US" smtClean="0"/>
-              <a:t>5/21/24</a:t>
+              <a:t>5/31/24</a:t>
             </a:fld>
             <a:endParaRPr lang="en-US"/>
           </a:p>
@@ -1241,7 +1385,7 @@
           <a:p>
             <a:fld id="{3EF31678-6B82-5B4B-834D-D2CBD0B9CFEC}" type="datetimeFigureOut">
               <a:rPr lang="en-US" smtClean="0"/>
-              <a:t>5/21/24</a:t>
+              <a:t>5/31/24</a:t>
             </a:fld>
             <a:endParaRPr lang="en-US"/>
           </a:p>
@@ -1451,7 +1595,7 @@
           <a:p>
             <a:fld id="{3EF31678-6B82-5B4B-834D-D2CBD0B9CFEC}" type="datetimeFigureOut">
               <a:rPr lang="en-US" smtClean="0"/>
-              <a:t>5/21/24</a:t>
+              <a:t>5/31/24</a:t>
             </a:fld>
             <a:endParaRPr lang="en-US"/>
           </a:p>
@@ -1651,7 +1795,7 @@
           <a:p>
             <a:fld id="{3EF31678-6B82-5B4B-834D-D2CBD0B9CFEC}" type="datetimeFigureOut">
               <a:rPr lang="en-US" smtClean="0"/>
-              <a:t>5/21/24</a:t>
+              <a:t>5/31/24</a:t>
             </a:fld>
             <a:endParaRPr lang="en-US"/>
           </a:p>
@@ -1927,7 +2071,7 @@
           <a:p>
             <a:fld id="{3EF31678-6B82-5B4B-834D-D2CBD0B9CFEC}" type="datetimeFigureOut">
               <a:rPr lang="en-US" smtClean="0"/>
-              <a:t>5/21/24</a:t>
+              <a:t>5/31/24</a:t>
             </a:fld>
             <a:endParaRPr lang="en-US"/>
           </a:p>
@@ -2195,7 +2339,7 @@
           <a:p>
             <a:fld id="{3EF31678-6B82-5B4B-834D-D2CBD0B9CFEC}" type="datetimeFigureOut">
               <a:rPr lang="en-US" smtClean="0"/>
-              <a:t>5/21/24</a:t>
+              <a:t>5/31/24</a:t>
             </a:fld>
             <a:endParaRPr lang="en-US"/>
           </a:p>
@@ -2610,7 +2754,7 @@
           <a:p>
             <a:fld id="{3EF31678-6B82-5B4B-834D-D2CBD0B9CFEC}" type="datetimeFigureOut">
               <a:rPr lang="en-US" smtClean="0"/>
-              <a:t>5/21/24</a:t>
+              <a:t>5/31/24</a:t>
             </a:fld>
             <a:endParaRPr lang="en-US"/>
           </a:p>
@@ -2752,7 +2896,7 @@
           <a:p>
             <a:fld id="{3EF31678-6B82-5B4B-834D-D2CBD0B9CFEC}" type="datetimeFigureOut">
               <a:rPr lang="en-US" smtClean="0"/>
-              <a:t>5/21/24</a:t>
+              <a:t>5/31/24</a:t>
             </a:fld>
             <a:endParaRPr lang="en-US"/>
           </a:p>
@@ -2865,7 +3009,7 @@
           <a:p>
             <a:fld id="{3EF31678-6B82-5B4B-834D-D2CBD0B9CFEC}" type="datetimeFigureOut">
               <a:rPr lang="en-US" smtClean="0"/>
-              <a:t>5/21/24</a:t>
+              <a:t>5/31/24</a:t>
             </a:fld>
             <a:endParaRPr lang="en-US"/>
           </a:p>
@@ -3178,7 +3322,7 @@
           <a:p>
             <a:fld id="{3EF31678-6B82-5B4B-834D-D2CBD0B9CFEC}" type="datetimeFigureOut">
               <a:rPr lang="en-US" smtClean="0"/>
-              <a:t>5/21/24</a:t>
+              <a:t>5/31/24</a:t>
             </a:fld>
             <a:endParaRPr lang="en-US"/>
           </a:p>
@@ -3467,7 +3611,7 @@
           <a:p>
             <a:fld id="{3EF31678-6B82-5B4B-834D-D2CBD0B9CFEC}" type="datetimeFigureOut">
               <a:rPr lang="en-US" smtClean="0"/>
-              <a:t>5/21/24</a:t>
+              <a:t>5/31/24</a:t>
             </a:fld>
             <a:endParaRPr lang="en-US"/>
           </a:p>
@@ -3710,7 +3854,7 @@
           <a:p>
             <a:fld id="{3EF31678-6B82-5B4B-834D-D2CBD0B9CFEC}" type="datetimeFigureOut">
               <a:rPr lang="en-US" smtClean="0"/>
-              <a:t>5/21/24</a:t>
+              <a:t>5/31/24</a:t>
             </a:fld>
             <a:endParaRPr lang="en-US"/>
           </a:p>
@@ -4220,6 +4364,121 @@
 </p:sld>
 </file>
 
+<file path=ppt/slides/slide10.xml><?xml version="1.0" encoding="utf-8"?>
+<p:sld xmlns:a="http://schemas.openxmlformats.org/drawingml/2006/main" xmlns:r="http://schemas.openxmlformats.org/officeDocument/2006/relationships" xmlns:p="http://schemas.openxmlformats.org/presentationml/2006/main">
+  <p:cSld>
+    <p:spTree>
+      <p:nvGrpSpPr>
+        <p:cNvPr id="1" name=""/>
+        <p:cNvGrpSpPr/>
+        <p:nvPr/>
+      </p:nvGrpSpPr>
+      <p:grpSpPr>
+        <a:xfrm>
+          <a:off x="0" y="0"/>
+          <a:ext cx="0" cy="0"/>
+          <a:chOff x="0" y="0"/>
+          <a:chExt cx="0" cy="0"/>
+        </a:xfrm>
+      </p:grpSpPr>
+      <p:sp>
+        <p:nvSpPr>
+          <p:cNvPr id="2" name="Title 1">
+            <a:extLst>
+              <a:ext uri="{FF2B5EF4-FFF2-40B4-BE49-F238E27FC236}">
+                <a16:creationId xmlns:a16="http://schemas.microsoft.com/office/drawing/2014/main" id="{B16402BF-BC41-8612-E5A9-BCBAE6923C2C}"/>
+              </a:ext>
+            </a:extLst>
+          </p:cNvPr>
+          <p:cNvSpPr>
+            <a:spLocks noGrp="1"/>
+          </p:cNvSpPr>
+          <p:nvPr>
+            <p:ph type="title"/>
+          </p:nvPr>
+        </p:nvSpPr>
+        <p:spPr/>
+        <p:txBody>
+          <a:bodyPr/>
+          <a:lstStyle/>
+          <a:p>
+            <a:r>
+              <a:rPr lang="en-US" dirty="0"/>
+              <a:t>Future Directions</a:t>
+            </a:r>
+          </a:p>
+        </p:txBody>
+      </p:sp>
+      <p:sp>
+        <p:nvSpPr>
+          <p:cNvPr id="3" name="Content Placeholder 2">
+            <a:extLst>
+              <a:ext uri="{FF2B5EF4-FFF2-40B4-BE49-F238E27FC236}">
+                <a16:creationId xmlns:a16="http://schemas.microsoft.com/office/drawing/2014/main" id="{22304B87-6C6B-04C5-1FC7-E58797F546BD}"/>
+              </a:ext>
+            </a:extLst>
+          </p:cNvPr>
+          <p:cNvSpPr>
+            <a:spLocks noGrp="1"/>
+          </p:cNvSpPr>
+          <p:nvPr>
+            <p:ph idx="1"/>
+          </p:nvPr>
+        </p:nvSpPr>
+        <p:spPr/>
+        <p:txBody>
+          <a:bodyPr>
+            <a:normAutofit fontScale="92500" lnSpcReduction="20000"/>
+          </a:bodyPr>
+          <a:lstStyle/>
+          <a:p>
+            <a:r>
+              <a:rPr lang="en-US" dirty="0"/>
+              <a:t>Small errors in annotation can lead to increased false positives and increase low-throughput manual curation burden</a:t>
+            </a:r>
+          </a:p>
+          <a:p>
+            <a:endParaRPr lang="en-US" dirty="0"/>
+          </a:p>
+          <a:p>
+            <a:r>
+              <a:rPr lang="en-US" dirty="0"/>
+              <a:t>Diagnostic efforts are limited by high splicing tool output volume, but improved curation could provide substantial filtering power</a:t>
+            </a:r>
+          </a:p>
+          <a:p>
+            <a:endParaRPr lang="en-US" dirty="0"/>
+          </a:p>
+          <a:p>
+            <a:r>
+              <a:rPr lang="en-US" dirty="0"/>
+              <a:t>Unannotated junctions may highlight mis-mapping or unannotated isoforms, particularly when associated with high read counts</a:t>
+            </a:r>
+          </a:p>
+          <a:p>
+            <a:endParaRPr lang="en-US" dirty="0"/>
+          </a:p>
+          <a:p>
+            <a:r>
+              <a:rPr lang="en-US" dirty="0"/>
+              <a:t>Diagnostic utility will be further improved by protein level predictions, e.g., p. coordinates and functional domains</a:t>
+            </a:r>
+          </a:p>
+        </p:txBody>
+      </p:sp>
+    </p:spTree>
+    <p:extLst>
+      <p:ext uri="{BB962C8B-B14F-4D97-AF65-F5344CB8AC3E}">
+        <p14:creationId xmlns:p14="http://schemas.microsoft.com/office/powerpoint/2010/main" val="601041608"/>
+      </p:ext>
+    </p:extLst>
+  </p:cSld>
+  <p:clrMapOvr>
+    <a:masterClrMapping/>
+  </p:clrMapOvr>
+</p:sld>
+</file>
+
 <file path=ppt/slides/slide2.xml><?xml version="1.0" encoding="utf-8"?>
 <p:sld xmlns:a="http://schemas.openxmlformats.org/drawingml/2006/main" xmlns:r="http://schemas.openxmlformats.org/officeDocument/2006/relationships" xmlns:p="http://schemas.openxmlformats.org/presentationml/2006/main">
   <p:cSld>
@@ -6049,7 +6308,7 @@
           <a:p>
             <a:r>
               <a:rPr lang="en-US" dirty="0"/>
-              <a:t>RNA-sequencing alignment produces ‘split-reads’ that show the location of an intron</a:t>
+              <a:t>1. RNA-sequencing alignment produces ‘split-reads’ that show the location of an intron</a:t>
             </a:r>
           </a:p>
         </p:txBody>
@@ -6098,7 +6357,7 @@
           <a:p>
             <a:r>
               <a:rPr lang="en-US" dirty="0"/>
-              <a:t>This is recorded as genomic coordinates, but more information is needed for interpretation</a:t>
+              <a:t>2. This is recorded as genomic coordinates, but more information is needed for interpretation</a:t>
             </a:r>
           </a:p>
         </p:txBody>
@@ -6147,7 +6406,7 @@
           <a:p>
             <a:r>
               <a:rPr lang="en-US" dirty="0"/>
-              <a:t>This problem is compounded when assessing multiple introns from the output of some analysis</a:t>
+              <a:t>3. This problem is compounded when assessing multiple introns from the output of some analyses</a:t>
             </a:r>
           </a:p>
         </p:txBody>
@@ -6203,8 +6462,8 @@
           </p:pic>
         </mc:Fallback>
       </mc:AlternateContent>
-      <mc:AlternateContent xmlns:mc="http://schemas.openxmlformats.org/markup-compatibility/2006" xmlns:p14="http://schemas.microsoft.com/office/powerpoint/2010/main">
-        <mc:Choice Requires="p14">
+      <mc:AlternateContent xmlns:mc="http://schemas.openxmlformats.org/markup-compatibility/2006">
+        <mc:Choice xmlns:p14="http://schemas.microsoft.com/office/powerpoint/2010/main" Requires="p14">
           <p:contentPart p14:bwMode="auto" r:id="rId5">
             <p14:nvContentPartPr>
               <p14:cNvPr id="27" name="Ink 26">
@@ -6217,13 +6476,13 @@
               <p14:cNvContentPartPr/>
               <p14:nvPr/>
             </p14:nvContentPartPr>
-            <p14:xfrm>
-              <a:off x="7548608" y="2400448"/>
+            <p14:xfrm rot="10800000">
+              <a:off x="3921760" y="5042691"/>
               <a:ext cx="1829520" cy="585720"/>
             </p14:xfrm>
           </p:contentPart>
         </mc:Choice>
-        <mc:Fallback xmlns="">
+        <mc:Fallback>
           <p:pic>
             <p:nvPicPr>
               <p:cNvPr id="27" name="Ink 26">
@@ -6243,9 +6502,9 @@
               </a:stretch>
             </p:blipFill>
             <p:spPr>
-              <a:xfrm>
-                <a:off x="7539608" y="2391808"/>
-                <a:ext cx="1847160" cy="603360"/>
+              <a:xfrm rot="10800000">
+                <a:off x="3912762" y="5033691"/>
+                <a:ext cx="1847157" cy="603360"/>
               </a:xfrm>
               <a:prstGeom prst="rect">
                 <a:avLst/>
@@ -6264,6 +6523,239 @@
   <p:clrMapOvr>
     <a:masterClrMapping/>
   </p:clrMapOvr>
+  <p:timing>
+    <p:tnLst>
+      <p:par>
+        <p:cTn id="1" dur="indefinite" restart="never" nodeType="tmRoot">
+          <p:childTnLst>
+            <p:seq concurrent="1" nextAc="seek">
+              <p:cTn id="2" dur="indefinite" nodeType="mainSeq">
+                <p:childTnLst>
+                  <p:par>
+                    <p:cTn id="3" fill="hold">
+                      <p:stCondLst>
+                        <p:cond delay="indefinite"/>
+                      </p:stCondLst>
+                      <p:childTnLst>
+                        <p:par>
+                          <p:cTn id="4" fill="hold">
+                            <p:stCondLst>
+                              <p:cond delay="0"/>
+                            </p:stCondLst>
+                            <p:childTnLst>
+                              <p:par>
+                                <p:cTn id="5" presetID="1" presetClass="entr" presetSubtype="0" fill="hold" nodeType="clickEffect">
+                                  <p:stCondLst>
+                                    <p:cond delay="0"/>
+                                  </p:stCondLst>
+                                  <p:childTnLst>
+                                    <p:set>
+                                      <p:cBhvr>
+                                        <p:cTn id="6" dur="1" fill="hold">
+                                          <p:stCondLst>
+                                            <p:cond delay="0"/>
+                                          </p:stCondLst>
+                                        </p:cTn>
+                                        <p:tgtEl>
+                                          <p:spTgt spid="24"/>
+                                        </p:tgtEl>
+                                        <p:attrNameLst>
+                                          <p:attrName>style.visibility</p:attrName>
+                                        </p:attrNameLst>
+                                      </p:cBhvr>
+                                      <p:to>
+                                        <p:strVal val="visible"/>
+                                      </p:to>
+                                    </p:set>
+                                  </p:childTnLst>
+                                </p:cTn>
+                              </p:par>
+                              <p:par>
+                                <p:cTn id="7" presetID="1" presetClass="entr" presetSubtype="0" fill="hold" grpId="0" nodeType="withEffect">
+                                  <p:stCondLst>
+                                    <p:cond delay="0"/>
+                                  </p:stCondLst>
+                                  <p:childTnLst>
+                                    <p:set>
+                                      <p:cBhvr>
+                                        <p:cTn id="8" dur="1" fill="hold">
+                                          <p:stCondLst>
+                                            <p:cond delay="0"/>
+                                          </p:stCondLst>
+                                        </p:cTn>
+                                        <p:tgtEl>
+                                          <p:spTgt spid="16"/>
+                                        </p:tgtEl>
+                                        <p:attrNameLst>
+                                          <p:attrName>style.visibility</p:attrName>
+                                        </p:attrNameLst>
+                                      </p:cBhvr>
+                                      <p:to>
+                                        <p:strVal val="visible"/>
+                                      </p:to>
+                                    </p:set>
+                                  </p:childTnLst>
+                                </p:cTn>
+                              </p:par>
+                              <p:par>
+                                <p:cTn id="9" presetID="1" presetClass="entr" presetSubtype="0" fill="hold" grpId="0" nodeType="withEffect">
+                                  <p:stCondLst>
+                                    <p:cond delay="0"/>
+                                  </p:stCondLst>
+                                  <p:childTnLst>
+                                    <p:set>
+                                      <p:cBhvr>
+                                        <p:cTn id="10" dur="1" fill="hold">
+                                          <p:stCondLst>
+                                            <p:cond delay="0"/>
+                                          </p:stCondLst>
+                                        </p:cTn>
+                                        <p:tgtEl>
+                                          <p:spTgt spid="22"/>
+                                        </p:tgtEl>
+                                        <p:attrNameLst>
+                                          <p:attrName>style.visibility</p:attrName>
+                                        </p:attrNameLst>
+                                      </p:cBhvr>
+                                      <p:to>
+                                        <p:strVal val="visible"/>
+                                      </p:to>
+                                    </p:set>
+                                  </p:childTnLst>
+                                </p:cTn>
+                              </p:par>
+                            </p:childTnLst>
+                          </p:cTn>
+                        </p:par>
+                      </p:childTnLst>
+                    </p:cTn>
+                  </p:par>
+                  <p:par>
+                    <p:cTn id="11" fill="hold">
+                      <p:stCondLst>
+                        <p:cond delay="indefinite"/>
+                      </p:stCondLst>
+                      <p:childTnLst>
+                        <p:par>
+                          <p:cTn id="12" fill="hold">
+                            <p:stCondLst>
+                              <p:cond delay="0"/>
+                            </p:stCondLst>
+                            <p:childTnLst>
+                              <p:par>
+                                <p:cTn id="13" presetID="1" presetClass="entr" presetSubtype="0" fill="hold" grpId="0" nodeType="clickEffect">
+                                  <p:stCondLst>
+                                    <p:cond delay="0"/>
+                                  </p:stCondLst>
+                                  <p:childTnLst>
+                                    <p:set>
+                                      <p:cBhvr>
+                                        <p:cTn id="14" dur="1" fill="hold">
+                                          <p:stCondLst>
+                                            <p:cond delay="0"/>
+                                          </p:stCondLst>
+                                        </p:cTn>
+                                        <p:tgtEl>
+                                          <p:spTgt spid="23"/>
+                                        </p:tgtEl>
+                                        <p:attrNameLst>
+                                          <p:attrName>style.visibility</p:attrName>
+                                        </p:attrNameLst>
+                                      </p:cBhvr>
+                                      <p:to>
+                                        <p:strVal val="visible"/>
+                                      </p:to>
+                                    </p:set>
+                                  </p:childTnLst>
+                                </p:cTn>
+                              </p:par>
+                              <p:par>
+                                <p:cTn id="15" presetID="1" presetClass="entr" presetSubtype="0" fill="hold" nodeType="withEffect">
+                                  <p:stCondLst>
+                                    <p:cond delay="0"/>
+                                  </p:stCondLst>
+                                  <p:childTnLst>
+                                    <p:set>
+                                      <p:cBhvr>
+                                        <p:cTn id="16" dur="1" fill="hold">
+                                          <p:stCondLst>
+                                            <p:cond delay="0"/>
+                                          </p:stCondLst>
+                                        </p:cTn>
+                                        <p:tgtEl>
+                                          <p:spTgt spid="19"/>
+                                        </p:tgtEl>
+                                        <p:attrNameLst>
+                                          <p:attrName>style.visibility</p:attrName>
+                                        </p:attrNameLst>
+                                      </p:cBhvr>
+                                      <p:to>
+                                        <p:strVal val="visible"/>
+                                      </p:to>
+                                    </p:set>
+                                  </p:childTnLst>
+                                </p:cTn>
+                              </p:par>
+                              <p:par>
+                                <p:cTn id="17" presetID="1" presetClass="entr" presetSubtype="0" fill="hold" nodeType="withEffect">
+                                  <p:stCondLst>
+                                    <p:cond delay="0"/>
+                                  </p:stCondLst>
+                                  <p:childTnLst>
+                                    <p:set>
+                                      <p:cBhvr>
+                                        <p:cTn id="18" dur="1" fill="hold">
+                                          <p:stCondLst>
+                                            <p:cond delay="0"/>
+                                          </p:stCondLst>
+                                        </p:cTn>
+                                        <p:tgtEl>
+                                          <p:spTgt spid="27"/>
+                                        </p:tgtEl>
+                                        <p:attrNameLst>
+                                          <p:attrName>style.visibility</p:attrName>
+                                        </p:attrNameLst>
+                                      </p:cBhvr>
+                                      <p:to>
+                                        <p:strVal val="visible"/>
+                                      </p:to>
+                                    </p:set>
+                                  </p:childTnLst>
+                                </p:cTn>
+                              </p:par>
+                            </p:childTnLst>
+                          </p:cTn>
+                        </p:par>
+                      </p:childTnLst>
+                    </p:cTn>
+                  </p:par>
+                </p:childTnLst>
+              </p:cTn>
+              <p:prevCondLst>
+                <p:cond evt="onPrev" delay="0">
+                  <p:tgtEl>
+                    <p:sldTgt/>
+                  </p:tgtEl>
+                </p:cond>
+              </p:prevCondLst>
+              <p:nextCondLst>
+                <p:cond evt="onNext" delay="0">
+                  <p:tgtEl>
+                    <p:sldTgt/>
+                  </p:tgtEl>
+                </p:cond>
+              </p:nextCondLst>
+            </p:seq>
+          </p:childTnLst>
+        </p:cTn>
+      </p:par>
+    </p:tnLst>
+    <p:bldLst>
+      <p:bldP spid="16" grpId="0"/>
+      <p:bldP spid="22" grpId="0" animBg="1"/>
+      <p:bldP spid="23" grpId="0" animBg="1"/>
+    </p:bldLst>
+  </p:timing>
 </p:sld>
 </file>
 
@@ -7028,10 +7520,314 @@
   <p:clrMapOvr>
     <a:masterClrMapping/>
   </p:clrMapOvr>
+  <p:timing>
+    <p:tnLst>
+      <p:par>
+        <p:cTn id="1" dur="indefinite" restart="never" nodeType="tmRoot">
+          <p:childTnLst>
+            <p:seq concurrent="1" nextAc="seek">
+              <p:cTn id="2" dur="indefinite" nodeType="mainSeq">
+                <p:childTnLst>
+                  <p:par>
+                    <p:cTn id="3" fill="hold">
+                      <p:stCondLst>
+                        <p:cond delay="indefinite"/>
+                      </p:stCondLst>
+                      <p:childTnLst>
+                        <p:par>
+                          <p:cTn id="4" fill="hold">
+                            <p:stCondLst>
+                              <p:cond delay="0"/>
+                            </p:stCondLst>
+                            <p:childTnLst>
+                              <p:par>
+                                <p:cTn id="5" presetID="1" presetClass="entr" presetSubtype="0" fill="hold" grpId="0" nodeType="clickEffect">
+                                  <p:stCondLst>
+                                    <p:cond delay="0"/>
+                                  </p:stCondLst>
+                                  <p:childTnLst>
+                                    <p:set>
+                                      <p:cBhvr>
+                                        <p:cTn id="6" dur="1" fill="hold">
+                                          <p:stCondLst>
+                                            <p:cond delay="0"/>
+                                          </p:stCondLst>
+                                        </p:cTn>
+                                        <p:tgtEl>
+                                          <p:spTgt spid="16"/>
+                                        </p:tgtEl>
+                                        <p:attrNameLst>
+                                          <p:attrName>style.visibility</p:attrName>
+                                        </p:attrNameLst>
+                                      </p:cBhvr>
+                                      <p:to>
+                                        <p:strVal val="visible"/>
+                                      </p:to>
+                                    </p:set>
+                                  </p:childTnLst>
+                                </p:cTn>
+                              </p:par>
+                            </p:childTnLst>
+                          </p:cTn>
+                        </p:par>
+                      </p:childTnLst>
+                    </p:cTn>
+                  </p:par>
+                  <p:par>
+                    <p:cTn id="7" fill="hold">
+                      <p:stCondLst>
+                        <p:cond delay="indefinite"/>
+                      </p:stCondLst>
+                      <p:childTnLst>
+                        <p:par>
+                          <p:cTn id="8" fill="hold">
+                            <p:stCondLst>
+                              <p:cond delay="0"/>
+                            </p:stCondLst>
+                            <p:childTnLst>
+                              <p:par>
+                                <p:cTn id="9" presetID="1" presetClass="entr" presetSubtype="0" fill="hold" grpId="0" nodeType="clickEffect">
+                                  <p:stCondLst>
+                                    <p:cond delay="0"/>
+                                  </p:stCondLst>
+                                  <p:childTnLst>
+                                    <p:set>
+                                      <p:cBhvr>
+                                        <p:cTn id="10" dur="1" fill="hold">
+                                          <p:stCondLst>
+                                            <p:cond delay="0"/>
+                                          </p:stCondLst>
+                                        </p:cTn>
+                                        <p:tgtEl>
+                                          <p:spTgt spid="17"/>
+                                        </p:tgtEl>
+                                        <p:attrNameLst>
+                                          <p:attrName>style.visibility</p:attrName>
+                                        </p:attrNameLst>
+                                      </p:cBhvr>
+                                      <p:to>
+                                        <p:strVal val="visible"/>
+                                      </p:to>
+                                    </p:set>
+                                  </p:childTnLst>
+                                </p:cTn>
+                              </p:par>
+                            </p:childTnLst>
+                          </p:cTn>
+                        </p:par>
+                      </p:childTnLst>
+                    </p:cTn>
+                  </p:par>
+                  <p:par>
+                    <p:cTn id="11" fill="hold">
+                      <p:stCondLst>
+                        <p:cond delay="indefinite"/>
+                      </p:stCondLst>
+                      <p:childTnLst>
+                        <p:par>
+                          <p:cTn id="12" fill="hold">
+                            <p:stCondLst>
+                              <p:cond delay="0"/>
+                            </p:stCondLst>
+                            <p:childTnLst>
+                              <p:par>
+                                <p:cTn id="13" presetID="1" presetClass="entr" presetSubtype="0" fill="hold" grpId="0" nodeType="clickEffect">
+                                  <p:stCondLst>
+                                    <p:cond delay="0"/>
+                                  </p:stCondLst>
+                                  <p:childTnLst>
+                                    <p:set>
+                                      <p:cBhvr>
+                                        <p:cTn id="14" dur="1" fill="hold">
+                                          <p:stCondLst>
+                                            <p:cond delay="0"/>
+                                          </p:stCondLst>
+                                        </p:cTn>
+                                        <p:tgtEl>
+                                          <p:spTgt spid="18"/>
+                                        </p:tgtEl>
+                                        <p:attrNameLst>
+                                          <p:attrName>style.visibility</p:attrName>
+                                        </p:attrNameLst>
+                                      </p:cBhvr>
+                                      <p:to>
+                                        <p:strVal val="visible"/>
+                                      </p:to>
+                                    </p:set>
+                                  </p:childTnLst>
+                                </p:cTn>
+                              </p:par>
+                              <p:par>
+                                <p:cTn id="15" presetID="1" presetClass="entr" presetSubtype="0" fill="hold" grpId="0" nodeType="withEffect">
+                                  <p:stCondLst>
+                                    <p:cond delay="0"/>
+                                  </p:stCondLst>
+                                  <p:childTnLst>
+                                    <p:set>
+                                      <p:cBhvr>
+                                        <p:cTn id="16" dur="1" fill="hold">
+                                          <p:stCondLst>
+                                            <p:cond delay="0"/>
+                                          </p:stCondLst>
+                                        </p:cTn>
+                                        <p:tgtEl>
+                                          <p:spTgt spid="5"/>
+                                        </p:tgtEl>
+                                        <p:attrNameLst>
+                                          <p:attrName>style.visibility</p:attrName>
+                                        </p:attrNameLst>
+                                      </p:cBhvr>
+                                      <p:to>
+                                        <p:strVal val="visible"/>
+                                      </p:to>
+                                    </p:set>
+                                  </p:childTnLst>
+                                </p:cTn>
+                              </p:par>
+                            </p:childTnLst>
+                          </p:cTn>
+                        </p:par>
+                      </p:childTnLst>
+                    </p:cTn>
+                  </p:par>
+                  <p:par>
+                    <p:cTn id="17" fill="hold">
+                      <p:stCondLst>
+                        <p:cond delay="indefinite"/>
+                      </p:stCondLst>
+                      <p:childTnLst>
+                        <p:par>
+                          <p:cTn id="18" fill="hold">
+                            <p:stCondLst>
+                              <p:cond delay="0"/>
+                            </p:stCondLst>
+                            <p:childTnLst>
+                              <p:par>
+                                <p:cTn id="19" presetID="1" presetClass="entr" presetSubtype="0" fill="hold" grpId="0" nodeType="clickEffect">
+                                  <p:stCondLst>
+                                    <p:cond delay="0"/>
+                                  </p:stCondLst>
+                                  <p:childTnLst>
+                                    <p:set>
+                                      <p:cBhvr>
+                                        <p:cTn id="20" dur="1" fill="hold">
+                                          <p:stCondLst>
+                                            <p:cond delay="0"/>
+                                          </p:stCondLst>
+                                        </p:cTn>
+                                        <p:tgtEl>
+                                          <p:spTgt spid="19"/>
+                                        </p:tgtEl>
+                                        <p:attrNameLst>
+                                          <p:attrName>style.visibility</p:attrName>
+                                        </p:attrNameLst>
+                                      </p:cBhvr>
+                                      <p:to>
+                                        <p:strVal val="visible"/>
+                                      </p:to>
+                                    </p:set>
+                                  </p:childTnLst>
+                                </p:cTn>
+                              </p:par>
+                            </p:childTnLst>
+                          </p:cTn>
+                        </p:par>
+                      </p:childTnLst>
+                    </p:cTn>
+                  </p:par>
+                </p:childTnLst>
+              </p:cTn>
+              <p:prevCondLst>
+                <p:cond evt="onPrev" delay="0">
+                  <p:tgtEl>
+                    <p:sldTgt/>
+                  </p:tgtEl>
+                </p:cond>
+              </p:prevCondLst>
+              <p:nextCondLst>
+                <p:cond evt="onNext" delay="0">
+                  <p:tgtEl>
+                    <p:sldTgt/>
+                  </p:tgtEl>
+                </p:cond>
+              </p:nextCondLst>
+            </p:seq>
+          </p:childTnLst>
+        </p:cTn>
+      </p:par>
+    </p:tnLst>
+    <p:bldLst>
+      <p:bldP spid="5" grpId="0"/>
+      <p:bldP spid="16" grpId="0" animBg="1"/>
+      <p:bldP spid="17" grpId="0" animBg="1"/>
+      <p:bldP spid="18" grpId="0" animBg="1"/>
+      <p:bldP spid="19" grpId="0" animBg="1"/>
+    </p:bldLst>
+  </p:timing>
 </p:sld>
 </file>
 
 <file path=ppt/slides/slide4.xml><?xml version="1.0" encoding="utf-8"?>
+<p:sld xmlns:a="http://schemas.openxmlformats.org/drawingml/2006/main" xmlns:r="http://schemas.openxmlformats.org/officeDocument/2006/relationships" xmlns:p="http://schemas.openxmlformats.org/presentationml/2006/main">
+  <p:cSld>
+    <p:spTree>
+      <p:nvGrpSpPr>
+        <p:cNvPr id="1" name=""/>
+        <p:cNvGrpSpPr/>
+        <p:nvPr/>
+      </p:nvGrpSpPr>
+      <p:grpSpPr>
+        <a:xfrm>
+          <a:off x="0" y="0"/>
+          <a:ext cx="0" cy="0"/>
+          <a:chOff x="0" y="0"/>
+          <a:chExt cx="0" cy="0"/>
+        </a:xfrm>
+      </p:grpSpPr>
+      <p:pic>
+        <p:nvPicPr>
+          <p:cNvPr id="4" name="Picture 3" descr="A diagram of different types of lines&#10;&#10;Description automatically generated">
+            <a:extLst>
+              <a:ext uri="{FF2B5EF4-FFF2-40B4-BE49-F238E27FC236}">
+                <a16:creationId xmlns:a16="http://schemas.microsoft.com/office/drawing/2014/main" id="{1014A864-B3B3-5380-0D49-D27BA40F769B}"/>
+              </a:ext>
+            </a:extLst>
+          </p:cNvPr>
+          <p:cNvPicPr>
+            <a:picLocks noChangeAspect="1"/>
+          </p:cNvPicPr>
+          <p:nvPr/>
+        </p:nvPicPr>
+        <p:blipFill>
+          <a:blip r:embed="rId2"/>
+          <a:stretch>
+            <a:fillRect/>
+          </a:stretch>
+        </p:blipFill>
+        <p:spPr>
+          <a:xfrm>
+            <a:off x="1275071" y="187859"/>
+            <a:ext cx="9641857" cy="6482281"/>
+          </a:xfrm>
+          <a:prstGeom prst="rect">
+            <a:avLst/>
+          </a:prstGeom>
+        </p:spPr>
+      </p:pic>
+    </p:spTree>
+    <p:extLst>
+      <p:ext uri="{BB962C8B-B14F-4D97-AF65-F5344CB8AC3E}">
+        <p14:creationId xmlns:p14="http://schemas.microsoft.com/office/powerpoint/2010/main" val="426165249"/>
+      </p:ext>
+    </p:extLst>
+  </p:cSld>
+  <p:clrMapOvr>
+    <a:masterClrMapping/>
+  </p:clrMapOvr>
+</p:sld>
+</file>
+
+<file path=ppt/slides/slide5.xml><?xml version="1.0" encoding="utf-8"?>
 <p:sld xmlns:a="http://schemas.openxmlformats.org/drawingml/2006/main" xmlns:r="http://schemas.openxmlformats.org/officeDocument/2006/relationships" xmlns:p="http://schemas.openxmlformats.org/presentationml/2006/main">
   <p:cSld>
     <p:spTree>
@@ -9153,7 +9949,7 @@
 </p:sld>
 </file>
 
-<file path=ppt/slides/slide5.xml><?xml version="1.0" encoding="utf-8"?>
+<file path=ppt/slides/slide6.xml><?xml version="1.0" encoding="utf-8"?>
 <p:sld xmlns:a="http://schemas.openxmlformats.org/drawingml/2006/main" xmlns:r="http://schemas.openxmlformats.org/officeDocument/2006/relationships" xmlns:p="http://schemas.openxmlformats.org/presentationml/2006/main">
   <p:cSld>
     <p:spTree>
@@ -9283,10 +10079,85 @@
   <p:clrMapOvr>
     <a:masterClrMapping/>
   </p:clrMapOvr>
+  <p:timing>
+    <p:tnLst>
+      <p:par>
+        <p:cTn id="1" dur="indefinite" restart="never" nodeType="tmRoot">
+          <p:childTnLst>
+            <p:seq concurrent="1" nextAc="seek">
+              <p:cTn id="2" dur="indefinite" nodeType="mainSeq">
+                <p:childTnLst>
+                  <p:par>
+                    <p:cTn id="3" fill="hold">
+                      <p:stCondLst>
+                        <p:cond delay="indefinite"/>
+                      </p:stCondLst>
+                      <p:childTnLst>
+                        <p:par>
+                          <p:cTn id="4" fill="hold">
+                            <p:stCondLst>
+                              <p:cond delay="0"/>
+                            </p:stCondLst>
+                            <p:childTnLst>
+                              <p:par>
+                                <p:cTn id="5" presetID="1" presetClass="entr" presetSubtype="0" fill="hold" nodeType="clickEffect">
+                                  <p:stCondLst>
+                                    <p:cond delay="0"/>
+                                  </p:stCondLst>
+                                  <p:childTnLst>
+                                    <p:set>
+                                      <p:cBhvr>
+                                        <p:cTn id="6" dur="1" fill="hold">
+                                          <p:stCondLst>
+                                            <p:cond delay="0"/>
+                                          </p:stCondLst>
+                                        </p:cTn>
+                                        <p:tgtEl>
+                                          <p:spTgt spid="9"/>
+                                        </p:tgtEl>
+                                        <p:attrNameLst>
+                                          <p:attrName>style.visibility</p:attrName>
+                                        </p:attrNameLst>
+                                      </p:cBhvr>
+                                      <p:to>
+                                        <p:strVal val="visible"/>
+                                      </p:to>
+                                    </p:set>
+                                  </p:childTnLst>
+                                </p:cTn>
+                              </p:par>
+                            </p:childTnLst>
+                          </p:cTn>
+                        </p:par>
+                      </p:childTnLst>
+                    </p:cTn>
+                  </p:par>
+                </p:childTnLst>
+              </p:cTn>
+              <p:prevCondLst>
+                <p:cond evt="onPrev" delay="0">
+                  <p:tgtEl>
+                    <p:sldTgt/>
+                  </p:tgtEl>
+                </p:cond>
+              </p:prevCondLst>
+              <p:nextCondLst>
+                <p:cond evt="onNext" delay="0">
+                  <p:tgtEl>
+                    <p:sldTgt/>
+                  </p:tgtEl>
+                </p:cond>
+              </p:nextCondLst>
+            </p:seq>
+          </p:childTnLst>
+        </p:cTn>
+      </p:par>
+    </p:tnLst>
+  </p:timing>
 </p:sld>
 </file>
 
-<file path=ppt/slides/slide6.xml><?xml version="1.0" encoding="utf-8"?>
+<file path=ppt/slides/slide7.xml><?xml version="1.0" encoding="utf-8"?>
 <p:sld xmlns:a="http://schemas.openxmlformats.org/drawingml/2006/main" xmlns:r="http://schemas.openxmlformats.org/officeDocument/2006/relationships" xmlns:p="http://schemas.openxmlformats.org/presentationml/2006/main">
   <p:cSld>
     <p:spTree>
@@ -9409,7 +10280,7 @@
 </p:sld>
 </file>
 
-<file path=ppt/slides/slide7.xml><?xml version="1.0" encoding="utf-8"?>
+<file path=ppt/slides/slide8.xml><?xml version="1.0" encoding="utf-8"?>
 <p:sld xmlns:a="http://schemas.openxmlformats.org/drawingml/2006/main" xmlns:r="http://schemas.openxmlformats.org/officeDocument/2006/relationships" xmlns:p="http://schemas.openxmlformats.org/presentationml/2006/main">
   <p:cSld>
     <p:spTree>
@@ -9533,7 +10404,7 @@
 </p:sld>
 </file>
 
-<file path=ppt/slides/slide8.xml><?xml version="1.0" encoding="utf-8"?>
+<file path=ppt/slides/slide9.xml><?xml version="1.0" encoding="utf-8"?>
 <p:sld xmlns:a="http://schemas.openxmlformats.org/drawingml/2006/main" xmlns:r="http://schemas.openxmlformats.org/officeDocument/2006/relationships" xmlns:p="http://schemas.openxmlformats.org/presentationml/2006/main">
   <p:cSld>
     <p:spTree>
@@ -9709,121 +10580,6 @@
     <p:extLst>
       <p:ext uri="{BB962C8B-B14F-4D97-AF65-F5344CB8AC3E}">
         <p14:creationId xmlns:p14="http://schemas.microsoft.com/office/powerpoint/2010/main" val="3614067962"/>
-      </p:ext>
-    </p:extLst>
-  </p:cSld>
-  <p:clrMapOvr>
-    <a:masterClrMapping/>
-  </p:clrMapOvr>
-</p:sld>
-</file>
-
-<file path=ppt/slides/slide9.xml><?xml version="1.0" encoding="utf-8"?>
-<p:sld xmlns:a="http://schemas.openxmlformats.org/drawingml/2006/main" xmlns:r="http://schemas.openxmlformats.org/officeDocument/2006/relationships" xmlns:p="http://schemas.openxmlformats.org/presentationml/2006/main">
-  <p:cSld>
-    <p:spTree>
-      <p:nvGrpSpPr>
-        <p:cNvPr id="1" name=""/>
-        <p:cNvGrpSpPr/>
-        <p:nvPr/>
-      </p:nvGrpSpPr>
-      <p:grpSpPr>
-        <a:xfrm>
-          <a:off x="0" y="0"/>
-          <a:ext cx="0" cy="0"/>
-          <a:chOff x="0" y="0"/>
-          <a:chExt cx="0" cy="0"/>
-        </a:xfrm>
-      </p:grpSpPr>
-      <p:sp>
-        <p:nvSpPr>
-          <p:cNvPr id="2" name="Title 1">
-            <a:extLst>
-              <a:ext uri="{FF2B5EF4-FFF2-40B4-BE49-F238E27FC236}">
-                <a16:creationId xmlns:a16="http://schemas.microsoft.com/office/drawing/2014/main" id="{B16402BF-BC41-8612-E5A9-BCBAE6923C2C}"/>
-              </a:ext>
-            </a:extLst>
-          </p:cNvPr>
-          <p:cNvSpPr>
-            <a:spLocks noGrp="1"/>
-          </p:cNvSpPr>
-          <p:nvPr>
-            <p:ph type="title"/>
-          </p:nvPr>
-        </p:nvSpPr>
-        <p:spPr/>
-        <p:txBody>
-          <a:bodyPr/>
-          <a:lstStyle/>
-          <a:p>
-            <a:r>
-              <a:rPr lang="en-US" dirty="0"/>
-              <a:t>Future Directions</a:t>
-            </a:r>
-          </a:p>
-        </p:txBody>
-      </p:sp>
-      <p:sp>
-        <p:nvSpPr>
-          <p:cNvPr id="3" name="Content Placeholder 2">
-            <a:extLst>
-              <a:ext uri="{FF2B5EF4-FFF2-40B4-BE49-F238E27FC236}">
-                <a16:creationId xmlns:a16="http://schemas.microsoft.com/office/drawing/2014/main" id="{22304B87-6C6B-04C5-1FC7-E58797F546BD}"/>
-              </a:ext>
-            </a:extLst>
-          </p:cNvPr>
-          <p:cNvSpPr>
-            <a:spLocks noGrp="1"/>
-          </p:cNvSpPr>
-          <p:nvPr>
-            <p:ph idx="1"/>
-          </p:nvPr>
-        </p:nvSpPr>
-        <p:spPr/>
-        <p:txBody>
-          <a:bodyPr>
-            <a:normAutofit fontScale="92500" lnSpcReduction="20000"/>
-          </a:bodyPr>
-          <a:lstStyle/>
-          <a:p>
-            <a:r>
-              <a:rPr lang="en-US" dirty="0"/>
-              <a:t>Small errors in annotation can lead to increased false positives and increase low-throughput manual curation</a:t>
-            </a:r>
-          </a:p>
-          <a:p>
-            <a:endParaRPr lang="en-US" dirty="0"/>
-          </a:p>
-          <a:p>
-            <a:r>
-              <a:rPr lang="en-US" dirty="0"/>
-              <a:t>Diagnostic efforts are limited by high splicing tool output volume, but improved curation could provide substantial filtering power</a:t>
-            </a:r>
-          </a:p>
-          <a:p>
-            <a:endParaRPr lang="en-US" dirty="0"/>
-          </a:p>
-          <a:p>
-            <a:r>
-              <a:rPr lang="en-US" dirty="0"/>
-              <a:t>Unannotated junctions may highlight mis-mapping or unannotated isoforms, particularly when associated with high read counts</a:t>
-            </a:r>
-          </a:p>
-          <a:p>
-            <a:endParaRPr lang="en-US" dirty="0"/>
-          </a:p>
-          <a:p>
-            <a:r>
-              <a:rPr lang="en-US" dirty="0"/>
-              <a:t>Diagnostic utility will be further improved by protein level predictions, e.g., p. coordinates and functional domains</a:t>
-            </a:r>
-          </a:p>
-        </p:txBody>
-      </p:sp>
-    </p:spTree>
-    <p:extLst>
-      <p:ext uri="{BB962C8B-B14F-4D97-AF65-F5344CB8AC3E}">
-        <p14:creationId xmlns:p14="http://schemas.microsoft.com/office/powerpoint/2010/main" val="601041608"/>
       </p:ext>
     </p:extLst>
   </p:cSld>

</xml_diff>

<commit_message>
add tx to output (#13)
</commit_message>
<xml_diff>
--- a/docs/splice-event-annotation.pptx
+++ b/docs/splice-event-annotation.pptx
@@ -8,12 +8,13 @@
     <p:sldId id="256" r:id="rId2"/>
     <p:sldId id="257" r:id="rId3"/>
     <p:sldId id="259" r:id="rId4"/>
-    <p:sldId id="262" r:id="rId5"/>
-    <p:sldId id="258" r:id="rId6"/>
-    <p:sldId id="260" r:id="rId7"/>
-    <p:sldId id="264" r:id="rId8"/>
-    <p:sldId id="263" r:id="rId9"/>
-    <p:sldId id="261" r:id="rId10"/>
+    <p:sldId id="265" r:id="rId5"/>
+    <p:sldId id="262" r:id="rId6"/>
+    <p:sldId id="258" r:id="rId7"/>
+    <p:sldId id="260" r:id="rId8"/>
+    <p:sldId id="264" r:id="rId9"/>
+    <p:sldId id="263" r:id="rId10"/>
+    <p:sldId id="261" r:id="rId11"/>
   </p:sldIdLst>
   <p:sldSz cx="12192000" cy="6858000"/>
   <p:notesSz cx="6858000" cy="9144000"/>
@@ -123,7 +124,7 @@
 <file path=ppt/revisionInfo.xml><?xml version="1.0" encoding="utf-8"?>
 <p1510:revInfo xmlns:a="http://schemas.openxmlformats.org/drawingml/2006/main" xmlns:r="http://schemas.openxmlformats.org/officeDocument/2006/relationships" xmlns:p1510="http://schemas.microsoft.com/office/powerpoint/2015/10/main">
   <p1510:revLst>
-    <p1510:client id="{7133A3CE-13BC-A846-BD39-2206C18E2A82}" v="38" dt="2024-05-21T02:58:04.074"/>
+    <p1510:client id="{7133A3CE-13BC-A846-BD39-2206C18E2A82}" v="52" dt="2024-05-30T23:51:00.175"/>
   </p1510:revLst>
 </p1510:revInfo>
 </file>
@@ -133,12 +134,12 @@
   <pc:docChgLst>
     <pc:chgData name="Rhett Marchant" userId="18df2c221d5c7175" providerId="LiveId" clId="{7133A3CE-13BC-A846-BD39-2206C18E2A82}"/>
     <pc:docChg chg="undo custSel addSld delSld modSld sldOrd">
-      <pc:chgData name="Rhett Marchant" userId="18df2c221d5c7175" providerId="LiveId" clId="{7133A3CE-13BC-A846-BD39-2206C18E2A82}" dt="2024-05-21T03:02:43.139" v="1551" actId="2162"/>
+      <pc:chgData name="Rhett Marchant" userId="18df2c221d5c7175" providerId="LiveId" clId="{7133A3CE-13BC-A846-BD39-2206C18E2A82}" dt="2024-05-30T23:51:00.175" v="1596"/>
       <pc:docMkLst>
         <pc:docMk/>
       </pc:docMkLst>
-      <pc:sldChg chg="addSp delSp modSp mod">
-        <pc:chgData name="Rhett Marchant" userId="18df2c221d5c7175" providerId="LiveId" clId="{7133A3CE-13BC-A846-BD39-2206C18E2A82}" dt="2024-05-21T02:35:16.701" v="635" actId="122"/>
+      <pc:sldChg chg="addSp delSp modSp mod modAnim">
+        <pc:chgData name="Rhett Marchant" userId="18df2c221d5c7175" providerId="LiveId" clId="{7133A3CE-13BC-A846-BD39-2206C18E2A82}" dt="2024-05-30T23:50:27.882" v="1588"/>
         <pc:sldMkLst>
           <pc:docMk/>
           <pc:sldMk cId="1867753254" sldId="257"/>
@@ -248,7 +249,7 @@
           </ac:spMkLst>
         </pc:spChg>
         <pc:spChg chg="add mod">
-          <ac:chgData name="Rhett Marchant" userId="18df2c221d5c7175" providerId="LiveId" clId="{7133A3CE-13BC-A846-BD39-2206C18E2A82}" dt="2024-05-21T02:28:59.115" v="353" actId="1076"/>
+          <ac:chgData name="Rhett Marchant" userId="18df2c221d5c7175" providerId="LiveId" clId="{7133A3CE-13BC-A846-BD39-2206C18E2A82}" dt="2024-05-30T23:42:18.903" v="1554" actId="20577"/>
           <ac:spMkLst>
             <pc:docMk/>
             <pc:sldMk cId="1867753254" sldId="257"/>
@@ -256,7 +257,7 @@
           </ac:spMkLst>
         </pc:spChg>
         <pc:spChg chg="add mod">
-          <ac:chgData name="Rhett Marchant" userId="18df2c221d5c7175" providerId="LiveId" clId="{7133A3CE-13BC-A846-BD39-2206C18E2A82}" dt="2024-05-21T02:29:53.016" v="455" actId="1076"/>
+          <ac:chgData name="Rhett Marchant" userId="18df2c221d5c7175" providerId="LiveId" clId="{7133A3CE-13BC-A846-BD39-2206C18E2A82}" dt="2024-05-30T23:42:21.862" v="1557" actId="20577"/>
           <ac:spMkLst>
             <pc:docMk/>
             <pc:sldMk cId="1867753254" sldId="257"/>
@@ -264,7 +265,7 @@
           </ac:spMkLst>
         </pc:spChg>
         <pc:spChg chg="add mod">
-          <ac:chgData name="Rhett Marchant" userId="18df2c221d5c7175" providerId="LiveId" clId="{7133A3CE-13BC-A846-BD39-2206C18E2A82}" dt="2024-05-21T02:30:42.078" v="564" actId="1076"/>
+          <ac:chgData name="Rhett Marchant" userId="18df2c221d5c7175" providerId="LiveId" clId="{7133A3CE-13BC-A846-BD39-2206C18E2A82}" dt="2024-05-30T23:42:27.064" v="1561" actId="20577"/>
           <ac:spMkLst>
             <pc:docMk/>
             <pc:sldMk cId="1867753254" sldId="257"/>
@@ -311,8 +312,8 @@
             <ac:inkMk id="26" creationId="{B26D2BA2-CF90-9AA1-8B21-31A176792F71}"/>
           </ac:inkMkLst>
         </pc:inkChg>
-        <pc:inkChg chg="add">
-          <ac:chgData name="Rhett Marchant" userId="18df2c221d5c7175" providerId="LiveId" clId="{7133A3CE-13BC-A846-BD39-2206C18E2A82}" dt="2024-05-21T02:32:45.596" v="624" actId="9405"/>
+        <pc:inkChg chg="add mod">
+          <ac:chgData name="Rhett Marchant" userId="18df2c221d5c7175" providerId="LiveId" clId="{7133A3CE-13BC-A846-BD39-2206C18E2A82}" dt="2024-05-30T23:50:18.580" v="1586" actId="1076"/>
           <ac:inkMkLst>
             <pc:docMk/>
             <pc:sldMk cId="1867753254" sldId="257"/>
@@ -328,8 +329,8 @@
           </ac:cxnSpMkLst>
         </pc:cxnChg>
       </pc:sldChg>
-      <pc:sldChg chg="addSp delSp modSp new mod">
-        <pc:chgData name="Rhett Marchant" userId="18df2c221d5c7175" providerId="LiveId" clId="{7133A3CE-13BC-A846-BD39-2206C18E2A82}" dt="2024-05-21T02:54:21.543" v="1173" actId="1076"/>
+      <pc:sldChg chg="addSp delSp modSp new mod modAnim">
+        <pc:chgData name="Rhett Marchant" userId="18df2c221d5c7175" providerId="LiveId" clId="{7133A3CE-13BC-A846-BD39-2206C18E2A82}" dt="2024-05-30T23:51:00.175" v="1596"/>
         <pc:sldMkLst>
           <pc:docMk/>
           <pc:sldMk cId="3249732208" sldId="258"/>
@@ -375,8 +376,8 @@
           </ac:picMkLst>
         </pc:picChg>
       </pc:sldChg>
-      <pc:sldChg chg="addSp delSp modSp new mod ord">
-        <pc:chgData name="Rhett Marchant" userId="18df2c221d5c7175" providerId="LiveId" clId="{7133A3CE-13BC-A846-BD39-2206C18E2A82}" dt="2024-05-21T02:50:40.418" v="1086" actId="207"/>
+      <pc:sldChg chg="addSp delSp modSp new mod ord modAnim">
+        <pc:chgData name="Rhett Marchant" userId="18df2c221d5c7175" providerId="LiveId" clId="{7133A3CE-13BC-A846-BD39-2206C18E2A82}" dt="2024-05-30T23:50:50.855" v="1595"/>
         <pc:sldMkLst>
           <pc:docMk/>
           <pc:sldMk cId="2336898673" sldId="259"/>
@@ -582,7 +583,7 @@
         </pc:picChg>
       </pc:sldChg>
       <pc:sldChg chg="modSp new mod">
-        <pc:chgData name="Rhett Marchant" userId="18df2c221d5c7175" providerId="LiveId" clId="{7133A3CE-13BC-A846-BD39-2206C18E2A82}" dt="2024-05-21T02:57:00.808" v="1304" actId="20577"/>
+        <pc:chgData name="Rhett Marchant" userId="18df2c221d5c7175" providerId="LiveId" clId="{7133A3CE-13BC-A846-BD39-2206C18E2A82}" dt="2024-05-30T23:42:58.069" v="1568" actId="20577"/>
         <pc:sldMkLst>
           <pc:docMk/>
           <pc:sldMk cId="601041608" sldId="261"/>
@@ -596,7 +597,7 @@
           </ac:spMkLst>
         </pc:spChg>
         <pc:spChg chg="mod">
-          <ac:chgData name="Rhett Marchant" userId="18df2c221d5c7175" providerId="LiveId" clId="{7133A3CE-13BC-A846-BD39-2206C18E2A82}" dt="2024-05-21T02:57:00.808" v="1304" actId="20577"/>
+          <ac:chgData name="Rhett Marchant" userId="18df2c221d5c7175" providerId="LiveId" clId="{7133A3CE-13BC-A846-BD39-2206C18E2A82}" dt="2024-05-30T23:42:58.069" v="1568" actId="20577"/>
           <ac:spMkLst>
             <pc:docMk/>
             <pc:sldMk cId="601041608" sldId="261"/>
@@ -824,6 +825,149 @@
           </ac:picMkLst>
         </pc:picChg>
       </pc:sldChg>
+      <pc:sldChg chg="addSp delSp modSp add mod">
+        <pc:chgData name="Rhett Marchant" userId="18df2c221d5c7175" providerId="LiveId" clId="{7133A3CE-13BC-A846-BD39-2206C18E2A82}" dt="2024-05-30T23:49:08.987" v="1581" actId="1076"/>
+        <pc:sldMkLst>
+          <pc:docMk/>
+          <pc:sldMk cId="426165249" sldId="265"/>
+        </pc:sldMkLst>
+        <pc:spChg chg="del">
+          <ac:chgData name="Rhett Marchant" userId="18df2c221d5c7175" providerId="LiveId" clId="{7133A3CE-13BC-A846-BD39-2206C18E2A82}" dt="2024-05-30T23:49:02.108" v="1577" actId="478"/>
+          <ac:spMkLst>
+            <pc:docMk/>
+            <pc:sldMk cId="426165249" sldId="265"/>
+            <ac:spMk id="2" creationId="{14B7B3DA-1DB1-8A64-6B4B-1BE65489421E}"/>
+          </ac:spMkLst>
+        </pc:spChg>
+        <pc:spChg chg="del">
+          <ac:chgData name="Rhett Marchant" userId="18df2c221d5c7175" providerId="LiveId" clId="{7133A3CE-13BC-A846-BD39-2206C18E2A82}" dt="2024-05-30T23:48:30.501" v="1570" actId="478"/>
+          <ac:spMkLst>
+            <pc:docMk/>
+            <pc:sldMk cId="426165249" sldId="265"/>
+            <ac:spMk id="5" creationId="{942BFAA8-5E46-FA16-C7CF-6DF5EA08D4A5}"/>
+          </ac:spMkLst>
+        </pc:spChg>
+        <pc:spChg chg="del">
+          <ac:chgData name="Rhett Marchant" userId="18df2c221d5c7175" providerId="LiveId" clId="{7133A3CE-13BC-A846-BD39-2206C18E2A82}" dt="2024-05-30T23:48:30.501" v="1570" actId="478"/>
+          <ac:spMkLst>
+            <pc:docMk/>
+            <pc:sldMk cId="426165249" sldId="265"/>
+            <ac:spMk id="7" creationId="{1C0822A9-BFC0-31D0-BC55-E0E6466614AB}"/>
+          </ac:spMkLst>
+        </pc:spChg>
+        <pc:spChg chg="del">
+          <ac:chgData name="Rhett Marchant" userId="18df2c221d5c7175" providerId="LiveId" clId="{7133A3CE-13BC-A846-BD39-2206C18E2A82}" dt="2024-05-30T23:48:30.501" v="1570" actId="478"/>
+          <ac:spMkLst>
+            <pc:docMk/>
+            <pc:sldMk cId="426165249" sldId="265"/>
+            <ac:spMk id="8" creationId="{5A3096A0-23D6-5F4D-F26D-919B0A207EA4}"/>
+          </ac:spMkLst>
+        </pc:spChg>
+        <pc:spChg chg="del">
+          <ac:chgData name="Rhett Marchant" userId="18df2c221d5c7175" providerId="LiveId" clId="{7133A3CE-13BC-A846-BD39-2206C18E2A82}" dt="2024-05-30T23:48:30.501" v="1570" actId="478"/>
+          <ac:spMkLst>
+            <pc:docMk/>
+            <pc:sldMk cId="426165249" sldId="265"/>
+            <ac:spMk id="9" creationId="{DCD8607F-FF3A-85FC-5CBC-398D802B9D4A}"/>
+          </ac:spMkLst>
+        </pc:spChg>
+        <pc:spChg chg="del">
+          <ac:chgData name="Rhett Marchant" userId="18df2c221d5c7175" providerId="LiveId" clId="{7133A3CE-13BC-A846-BD39-2206C18E2A82}" dt="2024-05-30T23:48:30.501" v="1570" actId="478"/>
+          <ac:spMkLst>
+            <pc:docMk/>
+            <pc:sldMk cId="426165249" sldId="265"/>
+            <ac:spMk id="10" creationId="{5F316266-D8F9-6AFF-710D-E1DA5E5FA021}"/>
+          </ac:spMkLst>
+        </pc:spChg>
+        <pc:spChg chg="add del mod">
+          <ac:chgData name="Rhett Marchant" userId="18df2c221d5c7175" providerId="LiveId" clId="{7133A3CE-13BC-A846-BD39-2206C18E2A82}" dt="2024-05-30T23:49:03.720" v="1578" actId="478"/>
+          <ac:spMkLst>
+            <pc:docMk/>
+            <pc:sldMk cId="426165249" sldId="265"/>
+            <ac:spMk id="13" creationId="{9CB2B2E5-0ACC-EEF7-1B60-4EFB0B5C35EC}"/>
+          </ac:spMkLst>
+        </pc:spChg>
+        <pc:spChg chg="del">
+          <ac:chgData name="Rhett Marchant" userId="18df2c221d5c7175" providerId="LiveId" clId="{7133A3CE-13BC-A846-BD39-2206C18E2A82}" dt="2024-05-30T23:48:30.501" v="1570" actId="478"/>
+          <ac:spMkLst>
+            <pc:docMk/>
+            <pc:sldMk cId="426165249" sldId="265"/>
+            <ac:spMk id="14" creationId="{B8C34AC0-56E1-F052-D729-09F2C930E065}"/>
+          </ac:spMkLst>
+        </pc:spChg>
+        <pc:spChg chg="del">
+          <ac:chgData name="Rhett Marchant" userId="18df2c221d5c7175" providerId="LiveId" clId="{7133A3CE-13BC-A846-BD39-2206C18E2A82}" dt="2024-05-30T23:48:30.501" v="1570" actId="478"/>
+          <ac:spMkLst>
+            <pc:docMk/>
+            <pc:sldMk cId="426165249" sldId="265"/>
+            <ac:spMk id="15" creationId="{0B1442AC-0D72-A728-9841-B3F4CE52ADDC}"/>
+          </ac:spMkLst>
+        </pc:spChg>
+        <pc:spChg chg="del">
+          <ac:chgData name="Rhett Marchant" userId="18df2c221d5c7175" providerId="LiveId" clId="{7133A3CE-13BC-A846-BD39-2206C18E2A82}" dt="2024-05-30T23:48:30.501" v="1570" actId="478"/>
+          <ac:spMkLst>
+            <pc:docMk/>
+            <pc:sldMk cId="426165249" sldId="265"/>
+            <ac:spMk id="16" creationId="{8FFE7A39-33F3-4601-0559-2521AD0E1D6F}"/>
+          </ac:spMkLst>
+        </pc:spChg>
+        <pc:spChg chg="del">
+          <ac:chgData name="Rhett Marchant" userId="18df2c221d5c7175" providerId="LiveId" clId="{7133A3CE-13BC-A846-BD39-2206C18E2A82}" dt="2024-05-30T23:48:30.501" v="1570" actId="478"/>
+          <ac:spMkLst>
+            <pc:docMk/>
+            <pc:sldMk cId="426165249" sldId="265"/>
+            <ac:spMk id="17" creationId="{E8EE128E-03BD-39A6-6BF0-7776B6A27FFC}"/>
+          </ac:spMkLst>
+        </pc:spChg>
+        <pc:spChg chg="del">
+          <ac:chgData name="Rhett Marchant" userId="18df2c221d5c7175" providerId="LiveId" clId="{7133A3CE-13BC-A846-BD39-2206C18E2A82}" dt="2024-05-30T23:48:30.501" v="1570" actId="478"/>
+          <ac:spMkLst>
+            <pc:docMk/>
+            <pc:sldMk cId="426165249" sldId="265"/>
+            <ac:spMk id="18" creationId="{EBC9CA0A-979D-795B-0B2E-6BB062A57924}"/>
+          </ac:spMkLst>
+        </pc:spChg>
+        <pc:spChg chg="del">
+          <ac:chgData name="Rhett Marchant" userId="18df2c221d5c7175" providerId="LiveId" clId="{7133A3CE-13BC-A846-BD39-2206C18E2A82}" dt="2024-05-30T23:48:30.501" v="1570" actId="478"/>
+          <ac:spMkLst>
+            <pc:docMk/>
+            <pc:sldMk cId="426165249" sldId="265"/>
+            <ac:spMk id="19" creationId="{0017A7AD-A7C8-07AE-A45E-2F9E7CF35487}"/>
+          </ac:spMkLst>
+        </pc:spChg>
+        <pc:spChg chg="del">
+          <ac:chgData name="Rhett Marchant" userId="18df2c221d5c7175" providerId="LiveId" clId="{7133A3CE-13BC-A846-BD39-2206C18E2A82}" dt="2024-05-30T23:48:30.501" v="1570" actId="478"/>
+          <ac:spMkLst>
+            <pc:docMk/>
+            <pc:sldMk cId="426165249" sldId="265"/>
+            <ac:spMk id="21" creationId="{F1E7E86B-6E8B-4BF7-09AD-8DD5FF562ED6}"/>
+          </ac:spMkLst>
+        </pc:spChg>
+        <pc:picChg chg="add mod">
+          <ac:chgData name="Rhett Marchant" userId="18df2c221d5c7175" providerId="LiveId" clId="{7133A3CE-13BC-A846-BD39-2206C18E2A82}" dt="2024-05-30T23:49:08.987" v="1581" actId="1076"/>
+          <ac:picMkLst>
+            <pc:docMk/>
+            <pc:sldMk cId="426165249" sldId="265"/>
+            <ac:picMk id="4" creationId="{1014A864-B3B3-5380-0D49-D27BA40F769B}"/>
+          </ac:picMkLst>
+        </pc:picChg>
+        <pc:picChg chg="del">
+          <ac:chgData name="Rhett Marchant" userId="18df2c221d5c7175" providerId="LiveId" clId="{7133A3CE-13BC-A846-BD39-2206C18E2A82}" dt="2024-05-30T23:48:30.501" v="1570" actId="478"/>
+          <ac:picMkLst>
+            <pc:docMk/>
+            <pc:sldMk cId="426165249" sldId="265"/>
+            <ac:picMk id="6" creationId="{9F66B1FC-7CAA-1C21-9CF0-1053666FB0DD}"/>
+          </ac:picMkLst>
+        </pc:picChg>
+        <pc:cxnChg chg="del mod">
+          <ac:chgData name="Rhett Marchant" userId="18df2c221d5c7175" providerId="LiveId" clId="{7133A3CE-13BC-A846-BD39-2206C18E2A82}" dt="2024-05-30T23:48:30.501" v="1570" actId="478"/>
+          <ac:cxnSpMkLst>
+            <pc:docMk/>
+            <pc:sldMk cId="426165249" sldId="265"/>
+            <ac:cxnSpMk id="11" creationId="{AFD62BE5-4085-DBE1-645E-9AF868CEC19E}"/>
+          </ac:cxnSpMkLst>
+        </pc:cxnChg>
+      </pc:sldChg>
       <pc:sldChg chg="new del">
         <pc:chgData name="Rhett Marchant" userId="18df2c221d5c7175" providerId="LiveId" clId="{7133A3CE-13BC-A846-BD39-2206C18E2A82}" dt="2024-05-21T03:00:43.184" v="1522" actId="2696"/>
         <pc:sldMkLst>
@@ -1041,7 +1185,7 @@
           <a:p>
             <a:fld id="{3EF31678-6B82-5B4B-834D-D2CBD0B9CFEC}" type="datetimeFigureOut">
               <a:rPr lang="en-US" smtClean="0"/>
-              <a:t>5/21/24</a:t>
+              <a:t>5/31/24</a:t>
             </a:fld>
             <a:endParaRPr lang="en-US"/>
           </a:p>
@@ -1241,7 +1385,7 @@
           <a:p>
             <a:fld id="{3EF31678-6B82-5B4B-834D-D2CBD0B9CFEC}" type="datetimeFigureOut">
               <a:rPr lang="en-US" smtClean="0"/>
-              <a:t>5/21/24</a:t>
+              <a:t>5/31/24</a:t>
             </a:fld>
             <a:endParaRPr lang="en-US"/>
           </a:p>
@@ -1451,7 +1595,7 @@
           <a:p>
             <a:fld id="{3EF31678-6B82-5B4B-834D-D2CBD0B9CFEC}" type="datetimeFigureOut">
               <a:rPr lang="en-US" smtClean="0"/>
-              <a:t>5/21/24</a:t>
+              <a:t>5/31/24</a:t>
             </a:fld>
             <a:endParaRPr lang="en-US"/>
           </a:p>
@@ -1651,7 +1795,7 @@
           <a:p>
             <a:fld id="{3EF31678-6B82-5B4B-834D-D2CBD0B9CFEC}" type="datetimeFigureOut">
               <a:rPr lang="en-US" smtClean="0"/>
-              <a:t>5/21/24</a:t>
+              <a:t>5/31/24</a:t>
             </a:fld>
             <a:endParaRPr lang="en-US"/>
           </a:p>
@@ -1927,7 +2071,7 @@
           <a:p>
             <a:fld id="{3EF31678-6B82-5B4B-834D-D2CBD0B9CFEC}" type="datetimeFigureOut">
               <a:rPr lang="en-US" smtClean="0"/>
-              <a:t>5/21/24</a:t>
+              <a:t>5/31/24</a:t>
             </a:fld>
             <a:endParaRPr lang="en-US"/>
           </a:p>
@@ -2195,7 +2339,7 @@
           <a:p>
             <a:fld id="{3EF31678-6B82-5B4B-834D-D2CBD0B9CFEC}" type="datetimeFigureOut">
               <a:rPr lang="en-US" smtClean="0"/>
-              <a:t>5/21/24</a:t>
+              <a:t>5/31/24</a:t>
             </a:fld>
             <a:endParaRPr lang="en-US"/>
           </a:p>
@@ -2610,7 +2754,7 @@
           <a:p>
             <a:fld id="{3EF31678-6B82-5B4B-834D-D2CBD0B9CFEC}" type="datetimeFigureOut">
               <a:rPr lang="en-US" smtClean="0"/>
-              <a:t>5/21/24</a:t>
+              <a:t>5/31/24</a:t>
             </a:fld>
             <a:endParaRPr lang="en-US"/>
           </a:p>
@@ -2752,7 +2896,7 @@
           <a:p>
             <a:fld id="{3EF31678-6B82-5B4B-834D-D2CBD0B9CFEC}" type="datetimeFigureOut">
               <a:rPr lang="en-US" smtClean="0"/>
-              <a:t>5/21/24</a:t>
+              <a:t>5/31/24</a:t>
             </a:fld>
             <a:endParaRPr lang="en-US"/>
           </a:p>
@@ -2865,7 +3009,7 @@
           <a:p>
             <a:fld id="{3EF31678-6B82-5B4B-834D-D2CBD0B9CFEC}" type="datetimeFigureOut">
               <a:rPr lang="en-US" smtClean="0"/>
-              <a:t>5/21/24</a:t>
+              <a:t>5/31/24</a:t>
             </a:fld>
             <a:endParaRPr lang="en-US"/>
           </a:p>
@@ -3178,7 +3322,7 @@
           <a:p>
             <a:fld id="{3EF31678-6B82-5B4B-834D-D2CBD0B9CFEC}" type="datetimeFigureOut">
               <a:rPr lang="en-US" smtClean="0"/>
-              <a:t>5/21/24</a:t>
+              <a:t>5/31/24</a:t>
             </a:fld>
             <a:endParaRPr lang="en-US"/>
           </a:p>
@@ -3467,7 +3611,7 @@
           <a:p>
             <a:fld id="{3EF31678-6B82-5B4B-834D-D2CBD0B9CFEC}" type="datetimeFigureOut">
               <a:rPr lang="en-US" smtClean="0"/>
-              <a:t>5/21/24</a:t>
+              <a:t>5/31/24</a:t>
             </a:fld>
             <a:endParaRPr lang="en-US"/>
           </a:p>
@@ -3710,7 +3854,7 @@
           <a:p>
             <a:fld id="{3EF31678-6B82-5B4B-834D-D2CBD0B9CFEC}" type="datetimeFigureOut">
               <a:rPr lang="en-US" smtClean="0"/>
-              <a:t>5/21/24</a:t>
+              <a:t>5/31/24</a:t>
             </a:fld>
             <a:endParaRPr lang="en-US"/>
           </a:p>
@@ -4220,6 +4364,121 @@
 </p:sld>
 </file>
 
+<file path=ppt/slides/slide10.xml><?xml version="1.0" encoding="utf-8"?>
+<p:sld xmlns:a="http://schemas.openxmlformats.org/drawingml/2006/main" xmlns:r="http://schemas.openxmlformats.org/officeDocument/2006/relationships" xmlns:p="http://schemas.openxmlformats.org/presentationml/2006/main">
+  <p:cSld>
+    <p:spTree>
+      <p:nvGrpSpPr>
+        <p:cNvPr id="1" name=""/>
+        <p:cNvGrpSpPr/>
+        <p:nvPr/>
+      </p:nvGrpSpPr>
+      <p:grpSpPr>
+        <a:xfrm>
+          <a:off x="0" y="0"/>
+          <a:ext cx="0" cy="0"/>
+          <a:chOff x="0" y="0"/>
+          <a:chExt cx="0" cy="0"/>
+        </a:xfrm>
+      </p:grpSpPr>
+      <p:sp>
+        <p:nvSpPr>
+          <p:cNvPr id="2" name="Title 1">
+            <a:extLst>
+              <a:ext uri="{FF2B5EF4-FFF2-40B4-BE49-F238E27FC236}">
+                <a16:creationId xmlns:a16="http://schemas.microsoft.com/office/drawing/2014/main" id="{B16402BF-BC41-8612-E5A9-BCBAE6923C2C}"/>
+              </a:ext>
+            </a:extLst>
+          </p:cNvPr>
+          <p:cNvSpPr>
+            <a:spLocks noGrp="1"/>
+          </p:cNvSpPr>
+          <p:nvPr>
+            <p:ph type="title"/>
+          </p:nvPr>
+        </p:nvSpPr>
+        <p:spPr/>
+        <p:txBody>
+          <a:bodyPr/>
+          <a:lstStyle/>
+          <a:p>
+            <a:r>
+              <a:rPr lang="en-US" dirty="0"/>
+              <a:t>Future Directions</a:t>
+            </a:r>
+          </a:p>
+        </p:txBody>
+      </p:sp>
+      <p:sp>
+        <p:nvSpPr>
+          <p:cNvPr id="3" name="Content Placeholder 2">
+            <a:extLst>
+              <a:ext uri="{FF2B5EF4-FFF2-40B4-BE49-F238E27FC236}">
+                <a16:creationId xmlns:a16="http://schemas.microsoft.com/office/drawing/2014/main" id="{22304B87-6C6B-04C5-1FC7-E58797F546BD}"/>
+              </a:ext>
+            </a:extLst>
+          </p:cNvPr>
+          <p:cNvSpPr>
+            <a:spLocks noGrp="1"/>
+          </p:cNvSpPr>
+          <p:nvPr>
+            <p:ph idx="1"/>
+          </p:nvPr>
+        </p:nvSpPr>
+        <p:spPr/>
+        <p:txBody>
+          <a:bodyPr>
+            <a:normAutofit fontScale="92500" lnSpcReduction="20000"/>
+          </a:bodyPr>
+          <a:lstStyle/>
+          <a:p>
+            <a:r>
+              <a:rPr lang="en-US" dirty="0"/>
+              <a:t>Small errors in annotation can lead to increased false positives and increase low-throughput manual curation burden</a:t>
+            </a:r>
+          </a:p>
+          <a:p>
+            <a:endParaRPr lang="en-US" dirty="0"/>
+          </a:p>
+          <a:p>
+            <a:r>
+              <a:rPr lang="en-US" dirty="0"/>
+              <a:t>Diagnostic efforts are limited by high splicing tool output volume, but improved curation could provide substantial filtering power</a:t>
+            </a:r>
+          </a:p>
+          <a:p>
+            <a:endParaRPr lang="en-US" dirty="0"/>
+          </a:p>
+          <a:p>
+            <a:r>
+              <a:rPr lang="en-US" dirty="0"/>
+              <a:t>Unannotated junctions may highlight mis-mapping or unannotated isoforms, particularly when associated with high read counts</a:t>
+            </a:r>
+          </a:p>
+          <a:p>
+            <a:endParaRPr lang="en-US" dirty="0"/>
+          </a:p>
+          <a:p>
+            <a:r>
+              <a:rPr lang="en-US" dirty="0"/>
+              <a:t>Diagnostic utility will be further improved by protein level predictions, e.g., p. coordinates and functional domains</a:t>
+            </a:r>
+          </a:p>
+        </p:txBody>
+      </p:sp>
+    </p:spTree>
+    <p:extLst>
+      <p:ext uri="{BB962C8B-B14F-4D97-AF65-F5344CB8AC3E}">
+        <p14:creationId xmlns:p14="http://schemas.microsoft.com/office/powerpoint/2010/main" val="601041608"/>
+      </p:ext>
+    </p:extLst>
+  </p:cSld>
+  <p:clrMapOvr>
+    <a:masterClrMapping/>
+  </p:clrMapOvr>
+</p:sld>
+</file>
+
 <file path=ppt/slides/slide2.xml><?xml version="1.0" encoding="utf-8"?>
 <p:sld xmlns:a="http://schemas.openxmlformats.org/drawingml/2006/main" xmlns:r="http://schemas.openxmlformats.org/officeDocument/2006/relationships" xmlns:p="http://schemas.openxmlformats.org/presentationml/2006/main">
   <p:cSld>
@@ -6049,7 +6308,7 @@
           <a:p>
             <a:r>
               <a:rPr lang="en-US" dirty="0"/>
-              <a:t>RNA-sequencing alignment produces ‘split-reads’ that show the location of an intron</a:t>
+              <a:t>1. RNA-sequencing alignment produces ‘split-reads’ that show the location of an intron</a:t>
             </a:r>
           </a:p>
         </p:txBody>
@@ -6098,7 +6357,7 @@
           <a:p>
             <a:r>
               <a:rPr lang="en-US" dirty="0"/>
-              <a:t>This is recorded as genomic coordinates, but more information is needed for interpretation</a:t>
+              <a:t>2. This is recorded as genomic coordinates, but more information is needed for interpretation</a:t>
             </a:r>
           </a:p>
         </p:txBody>
@@ -6147,7 +6406,7 @@
           <a:p>
             <a:r>
               <a:rPr lang="en-US" dirty="0"/>
-              <a:t>This problem is compounded when assessing multiple introns from the output of some analysis</a:t>
+              <a:t>3. This problem is compounded when assessing multiple introns from the output of some analyses</a:t>
             </a:r>
           </a:p>
         </p:txBody>
@@ -6203,8 +6462,8 @@
           </p:pic>
         </mc:Fallback>
       </mc:AlternateContent>
-      <mc:AlternateContent xmlns:mc="http://schemas.openxmlformats.org/markup-compatibility/2006" xmlns:p14="http://schemas.microsoft.com/office/powerpoint/2010/main">
-        <mc:Choice Requires="p14">
+      <mc:AlternateContent xmlns:mc="http://schemas.openxmlformats.org/markup-compatibility/2006">
+        <mc:Choice xmlns:p14="http://schemas.microsoft.com/office/powerpoint/2010/main" Requires="p14">
           <p:contentPart p14:bwMode="auto" r:id="rId5">
             <p14:nvContentPartPr>
               <p14:cNvPr id="27" name="Ink 26">
@@ -6217,13 +6476,13 @@
               <p14:cNvContentPartPr/>
               <p14:nvPr/>
             </p14:nvContentPartPr>
-            <p14:xfrm>
-              <a:off x="7548608" y="2400448"/>
+            <p14:xfrm rot="10800000">
+              <a:off x="3921760" y="5042691"/>
               <a:ext cx="1829520" cy="585720"/>
             </p14:xfrm>
           </p:contentPart>
         </mc:Choice>
-        <mc:Fallback xmlns="">
+        <mc:Fallback>
           <p:pic>
             <p:nvPicPr>
               <p:cNvPr id="27" name="Ink 26">
@@ -6243,9 +6502,9 @@
               </a:stretch>
             </p:blipFill>
             <p:spPr>
-              <a:xfrm>
-                <a:off x="7539608" y="2391808"/>
-                <a:ext cx="1847160" cy="603360"/>
+              <a:xfrm rot="10800000">
+                <a:off x="3912762" y="5033691"/>
+                <a:ext cx="1847157" cy="603360"/>
               </a:xfrm>
               <a:prstGeom prst="rect">
                 <a:avLst/>
@@ -6264,6 +6523,239 @@
   <p:clrMapOvr>
     <a:masterClrMapping/>
   </p:clrMapOvr>
+  <p:timing>
+    <p:tnLst>
+      <p:par>
+        <p:cTn id="1" dur="indefinite" restart="never" nodeType="tmRoot">
+          <p:childTnLst>
+            <p:seq concurrent="1" nextAc="seek">
+              <p:cTn id="2" dur="indefinite" nodeType="mainSeq">
+                <p:childTnLst>
+                  <p:par>
+                    <p:cTn id="3" fill="hold">
+                      <p:stCondLst>
+                        <p:cond delay="indefinite"/>
+                      </p:stCondLst>
+                      <p:childTnLst>
+                        <p:par>
+                          <p:cTn id="4" fill="hold">
+                            <p:stCondLst>
+                              <p:cond delay="0"/>
+                            </p:stCondLst>
+                            <p:childTnLst>
+                              <p:par>
+                                <p:cTn id="5" presetID="1" presetClass="entr" presetSubtype="0" fill="hold" nodeType="clickEffect">
+                                  <p:stCondLst>
+                                    <p:cond delay="0"/>
+                                  </p:stCondLst>
+                                  <p:childTnLst>
+                                    <p:set>
+                                      <p:cBhvr>
+                                        <p:cTn id="6" dur="1" fill="hold">
+                                          <p:stCondLst>
+                                            <p:cond delay="0"/>
+                                          </p:stCondLst>
+                                        </p:cTn>
+                                        <p:tgtEl>
+                                          <p:spTgt spid="24"/>
+                                        </p:tgtEl>
+                                        <p:attrNameLst>
+                                          <p:attrName>style.visibility</p:attrName>
+                                        </p:attrNameLst>
+                                      </p:cBhvr>
+                                      <p:to>
+                                        <p:strVal val="visible"/>
+                                      </p:to>
+                                    </p:set>
+                                  </p:childTnLst>
+                                </p:cTn>
+                              </p:par>
+                              <p:par>
+                                <p:cTn id="7" presetID="1" presetClass="entr" presetSubtype="0" fill="hold" grpId="0" nodeType="withEffect">
+                                  <p:stCondLst>
+                                    <p:cond delay="0"/>
+                                  </p:stCondLst>
+                                  <p:childTnLst>
+                                    <p:set>
+                                      <p:cBhvr>
+                                        <p:cTn id="8" dur="1" fill="hold">
+                                          <p:stCondLst>
+                                            <p:cond delay="0"/>
+                                          </p:stCondLst>
+                                        </p:cTn>
+                                        <p:tgtEl>
+                                          <p:spTgt spid="16"/>
+                                        </p:tgtEl>
+                                        <p:attrNameLst>
+                                          <p:attrName>style.visibility</p:attrName>
+                                        </p:attrNameLst>
+                                      </p:cBhvr>
+                                      <p:to>
+                                        <p:strVal val="visible"/>
+                                      </p:to>
+                                    </p:set>
+                                  </p:childTnLst>
+                                </p:cTn>
+                              </p:par>
+                              <p:par>
+                                <p:cTn id="9" presetID="1" presetClass="entr" presetSubtype="0" fill="hold" grpId="0" nodeType="withEffect">
+                                  <p:stCondLst>
+                                    <p:cond delay="0"/>
+                                  </p:stCondLst>
+                                  <p:childTnLst>
+                                    <p:set>
+                                      <p:cBhvr>
+                                        <p:cTn id="10" dur="1" fill="hold">
+                                          <p:stCondLst>
+                                            <p:cond delay="0"/>
+                                          </p:stCondLst>
+                                        </p:cTn>
+                                        <p:tgtEl>
+                                          <p:spTgt spid="22"/>
+                                        </p:tgtEl>
+                                        <p:attrNameLst>
+                                          <p:attrName>style.visibility</p:attrName>
+                                        </p:attrNameLst>
+                                      </p:cBhvr>
+                                      <p:to>
+                                        <p:strVal val="visible"/>
+                                      </p:to>
+                                    </p:set>
+                                  </p:childTnLst>
+                                </p:cTn>
+                              </p:par>
+                            </p:childTnLst>
+                          </p:cTn>
+                        </p:par>
+                      </p:childTnLst>
+                    </p:cTn>
+                  </p:par>
+                  <p:par>
+                    <p:cTn id="11" fill="hold">
+                      <p:stCondLst>
+                        <p:cond delay="indefinite"/>
+                      </p:stCondLst>
+                      <p:childTnLst>
+                        <p:par>
+                          <p:cTn id="12" fill="hold">
+                            <p:stCondLst>
+                              <p:cond delay="0"/>
+                            </p:stCondLst>
+                            <p:childTnLst>
+                              <p:par>
+                                <p:cTn id="13" presetID="1" presetClass="entr" presetSubtype="0" fill="hold" grpId="0" nodeType="clickEffect">
+                                  <p:stCondLst>
+                                    <p:cond delay="0"/>
+                                  </p:stCondLst>
+                                  <p:childTnLst>
+                                    <p:set>
+                                      <p:cBhvr>
+                                        <p:cTn id="14" dur="1" fill="hold">
+                                          <p:stCondLst>
+                                            <p:cond delay="0"/>
+                                          </p:stCondLst>
+                                        </p:cTn>
+                                        <p:tgtEl>
+                                          <p:spTgt spid="23"/>
+                                        </p:tgtEl>
+                                        <p:attrNameLst>
+                                          <p:attrName>style.visibility</p:attrName>
+                                        </p:attrNameLst>
+                                      </p:cBhvr>
+                                      <p:to>
+                                        <p:strVal val="visible"/>
+                                      </p:to>
+                                    </p:set>
+                                  </p:childTnLst>
+                                </p:cTn>
+                              </p:par>
+                              <p:par>
+                                <p:cTn id="15" presetID="1" presetClass="entr" presetSubtype="0" fill="hold" nodeType="withEffect">
+                                  <p:stCondLst>
+                                    <p:cond delay="0"/>
+                                  </p:stCondLst>
+                                  <p:childTnLst>
+                                    <p:set>
+                                      <p:cBhvr>
+                                        <p:cTn id="16" dur="1" fill="hold">
+                                          <p:stCondLst>
+                                            <p:cond delay="0"/>
+                                          </p:stCondLst>
+                                        </p:cTn>
+                                        <p:tgtEl>
+                                          <p:spTgt spid="19"/>
+                                        </p:tgtEl>
+                                        <p:attrNameLst>
+                                          <p:attrName>style.visibility</p:attrName>
+                                        </p:attrNameLst>
+                                      </p:cBhvr>
+                                      <p:to>
+                                        <p:strVal val="visible"/>
+                                      </p:to>
+                                    </p:set>
+                                  </p:childTnLst>
+                                </p:cTn>
+                              </p:par>
+                              <p:par>
+                                <p:cTn id="17" presetID="1" presetClass="entr" presetSubtype="0" fill="hold" nodeType="withEffect">
+                                  <p:stCondLst>
+                                    <p:cond delay="0"/>
+                                  </p:stCondLst>
+                                  <p:childTnLst>
+                                    <p:set>
+                                      <p:cBhvr>
+                                        <p:cTn id="18" dur="1" fill="hold">
+                                          <p:stCondLst>
+                                            <p:cond delay="0"/>
+                                          </p:stCondLst>
+                                        </p:cTn>
+                                        <p:tgtEl>
+                                          <p:spTgt spid="27"/>
+                                        </p:tgtEl>
+                                        <p:attrNameLst>
+                                          <p:attrName>style.visibility</p:attrName>
+                                        </p:attrNameLst>
+                                      </p:cBhvr>
+                                      <p:to>
+                                        <p:strVal val="visible"/>
+                                      </p:to>
+                                    </p:set>
+                                  </p:childTnLst>
+                                </p:cTn>
+                              </p:par>
+                            </p:childTnLst>
+                          </p:cTn>
+                        </p:par>
+                      </p:childTnLst>
+                    </p:cTn>
+                  </p:par>
+                </p:childTnLst>
+              </p:cTn>
+              <p:prevCondLst>
+                <p:cond evt="onPrev" delay="0">
+                  <p:tgtEl>
+                    <p:sldTgt/>
+                  </p:tgtEl>
+                </p:cond>
+              </p:prevCondLst>
+              <p:nextCondLst>
+                <p:cond evt="onNext" delay="0">
+                  <p:tgtEl>
+                    <p:sldTgt/>
+                  </p:tgtEl>
+                </p:cond>
+              </p:nextCondLst>
+            </p:seq>
+          </p:childTnLst>
+        </p:cTn>
+      </p:par>
+    </p:tnLst>
+    <p:bldLst>
+      <p:bldP spid="16" grpId="0"/>
+      <p:bldP spid="22" grpId="0" animBg="1"/>
+      <p:bldP spid="23" grpId="0" animBg="1"/>
+    </p:bldLst>
+  </p:timing>
 </p:sld>
 </file>
 
@@ -7028,10 +7520,314 @@
   <p:clrMapOvr>
     <a:masterClrMapping/>
   </p:clrMapOvr>
+  <p:timing>
+    <p:tnLst>
+      <p:par>
+        <p:cTn id="1" dur="indefinite" restart="never" nodeType="tmRoot">
+          <p:childTnLst>
+            <p:seq concurrent="1" nextAc="seek">
+              <p:cTn id="2" dur="indefinite" nodeType="mainSeq">
+                <p:childTnLst>
+                  <p:par>
+                    <p:cTn id="3" fill="hold">
+                      <p:stCondLst>
+                        <p:cond delay="indefinite"/>
+                      </p:stCondLst>
+                      <p:childTnLst>
+                        <p:par>
+                          <p:cTn id="4" fill="hold">
+                            <p:stCondLst>
+                              <p:cond delay="0"/>
+                            </p:stCondLst>
+                            <p:childTnLst>
+                              <p:par>
+                                <p:cTn id="5" presetID="1" presetClass="entr" presetSubtype="0" fill="hold" grpId="0" nodeType="clickEffect">
+                                  <p:stCondLst>
+                                    <p:cond delay="0"/>
+                                  </p:stCondLst>
+                                  <p:childTnLst>
+                                    <p:set>
+                                      <p:cBhvr>
+                                        <p:cTn id="6" dur="1" fill="hold">
+                                          <p:stCondLst>
+                                            <p:cond delay="0"/>
+                                          </p:stCondLst>
+                                        </p:cTn>
+                                        <p:tgtEl>
+                                          <p:spTgt spid="16"/>
+                                        </p:tgtEl>
+                                        <p:attrNameLst>
+                                          <p:attrName>style.visibility</p:attrName>
+                                        </p:attrNameLst>
+                                      </p:cBhvr>
+                                      <p:to>
+                                        <p:strVal val="visible"/>
+                                      </p:to>
+                                    </p:set>
+                                  </p:childTnLst>
+                                </p:cTn>
+                              </p:par>
+                            </p:childTnLst>
+                          </p:cTn>
+                        </p:par>
+                      </p:childTnLst>
+                    </p:cTn>
+                  </p:par>
+                  <p:par>
+                    <p:cTn id="7" fill="hold">
+                      <p:stCondLst>
+                        <p:cond delay="indefinite"/>
+                      </p:stCondLst>
+                      <p:childTnLst>
+                        <p:par>
+                          <p:cTn id="8" fill="hold">
+                            <p:stCondLst>
+                              <p:cond delay="0"/>
+                            </p:stCondLst>
+                            <p:childTnLst>
+                              <p:par>
+                                <p:cTn id="9" presetID="1" presetClass="entr" presetSubtype="0" fill="hold" grpId="0" nodeType="clickEffect">
+                                  <p:stCondLst>
+                                    <p:cond delay="0"/>
+                                  </p:stCondLst>
+                                  <p:childTnLst>
+                                    <p:set>
+                                      <p:cBhvr>
+                                        <p:cTn id="10" dur="1" fill="hold">
+                                          <p:stCondLst>
+                                            <p:cond delay="0"/>
+                                          </p:stCondLst>
+                                        </p:cTn>
+                                        <p:tgtEl>
+                                          <p:spTgt spid="17"/>
+                                        </p:tgtEl>
+                                        <p:attrNameLst>
+                                          <p:attrName>style.visibility</p:attrName>
+                                        </p:attrNameLst>
+                                      </p:cBhvr>
+                                      <p:to>
+                                        <p:strVal val="visible"/>
+                                      </p:to>
+                                    </p:set>
+                                  </p:childTnLst>
+                                </p:cTn>
+                              </p:par>
+                            </p:childTnLst>
+                          </p:cTn>
+                        </p:par>
+                      </p:childTnLst>
+                    </p:cTn>
+                  </p:par>
+                  <p:par>
+                    <p:cTn id="11" fill="hold">
+                      <p:stCondLst>
+                        <p:cond delay="indefinite"/>
+                      </p:stCondLst>
+                      <p:childTnLst>
+                        <p:par>
+                          <p:cTn id="12" fill="hold">
+                            <p:stCondLst>
+                              <p:cond delay="0"/>
+                            </p:stCondLst>
+                            <p:childTnLst>
+                              <p:par>
+                                <p:cTn id="13" presetID="1" presetClass="entr" presetSubtype="0" fill="hold" grpId="0" nodeType="clickEffect">
+                                  <p:stCondLst>
+                                    <p:cond delay="0"/>
+                                  </p:stCondLst>
+                                  <p:childTnLst>
+                                    <p:set>
+                                      <p:cBhvr>
+                                        <p:cTn id="14" dur="1" fill="hold">
+                                          <p:stCondLst>
+                                            <p:cond delay="0"/>
+                                          </p:stCondLst>
+                                        </p:cTn>
+                                        <p:tgtEl>
+                                          <p:spTgt spid="18"/>
+                                        </p:tgtEl>
+                                        <p:attrNameLst>
+                                          <p:attrName>style.visibility</p:attrName>
+                                        </p:attrNameLst>
+                                      </p:cBhvr>
+                                      <p:to>
+                                        <p:strVal val="visible"/>
+                                      </p:to>
+                                    </p:set>
+                                  </p:childTnLst>
+                                </p:cTn>
+                              </p:par>
+                              <p:par>
+                                <p:cTn id="15" presetID="1" presetClass="entr" presetSubtype="0" fill="hold" grpId="0" nodeType="withEffect">
+                                  <p:stCondLst>
+                                    <p:cond delay="0"/>
+                                  </p:stCondLst>
+                                  <p:childTnLst>
+                                    <p:set>
+                                      <p:cBhvr>
+                                        <p:cTn id="16" dur="1" fill="hold">
+                                          <p:stCondLst>
+                                            <p:cond delay="0"/>
+                                          </p:stCondLst>
+                                        </p:cTn>
+                                        <p:tgtEl>
+                                          <p:spTgt spid="5"/>
+                                        </p:tgtEl>
+                                        <p:attrNameLst>
+                                          <p:attrName>style.visibility</p:attrName>
+                                        </p:attrNameLst>
+                                      </p:cBhvr>
+                                      <p:to>
+                                        <p:strVal val="visible"/>
+                                      </p:to>
+                                    </p:set>
+                                  </p:childTnLst>
+                                </p:cTn>
+                              </p:par>
+                            </p:childTnLst>
+                          </p:cTn>
+                        </p:par>
+                      </p:childTnLst>
+                    </p:cTn>
+                  </p:par>
+                  <p:par>
+                    <p:cTn id="17" fill="hold">
+                      <p:stCondLst>
+                        <p:cond delay="indefinite"/>
+                      </p:stCondLst>
+                      <p:childTnLst>
+                        <p:par>
+                          <p:cTn id="18" fill="hold">
+                            <p:stCondLst>
+                              <p:cond delay="0"/>
+                            </p:stCondLst>
+                            <p:childTnLst>
+                              <p:par>
+                                <p:cTn id="19" presetID="1" presetClass="entr" presetSubtype="0" fill="hold" grpId="0" nodeType="clickEffect">
+                                  <p:stCondLst>
+                                    <p:cond delay="0"/>
+                                  </p:stCondLst>
+                                  <p:childTnLst>
+                                    <p:set>
+                                      <p:cBhvr>
+                                        <p:cTn id="20" dur="1" fill="hold">
+                                          <p:stCondLst>
+                                            <p:cond delay="0"/>
+                                          </p:stCondLst>
+                                        </p:cTn>
+                                        <p:tgtEl>
+                                          <p:spTgt spid="19"/>
+                                        </p:tgtEl>
+                                        <p:attrNameLst>
+                                          <p:attrName>style.visibility</p:attrName>
+                                        </p:attrNameLst>
+                                      </p:cBhvr>
+                                      <p:to>
+                                        <p:strVal val="visible"/>
+                                      </p:to>
+                                    </p:set>
+                                  </p:childTnLst>
+                                </p:cTn>
+                              </p:par>
+                            </p:childTnLst>
+                          </p:cTn>
+                        </p:par>
+                      </p:childTnLst>
+                    </p:cTn>
+                  </p:par>
+                </p:childTnLst>
+              </p:cTn>
+              <p:prevCondLst>
+                <p:cond evt="onPrev" delay="0">
+                  <p:tgtEl>
+                    <p:sldTgt/>
+                  </p:tgtEl>
+                </p:cond>
+              </p:prevCondLst>
+              <p:nextCondLst>
+                <p:cond evt="onNext" delay="0">
+                  <p:tgtEl>
+                    <p:sldTgt/>
+                  </p:tgtEl>
+                </p:cond>
+              </p:nextCondLst>
+            </p:seq>
+          </p:childTnLst>
+        </p:cTn>
+      </p:par>
+    </p:tnLst>
+    <p:bldLst>
+      <p:bldP spid="5" grpId="0"/>
+      <p:bldP spid="16" grpId="0" animBg="1"/>
+      <p:bldP spid="17" grpId="0" animBg="1"/>
+      <p:bldP spid="18" grpId="0" animBg="1"/>
+      <p:bldP spid="19" grpId="0" animBg="1"/>
+    </p:bldLst>
+  </p:timing>
 </p:sld>
 </file>
 
 <file path=ppt/slides/slide4.xml><?xml version="1.0" encoding="utf-8"?>
+<p:sld xmlns:a="http://schemas.openxmlformats.org/drawingml/2006/main" xmlns:r="http://schemas.openxmlformats.org/officeDocument/2006/relationships" xmlns:p="http://schemas.openxmlformats.org/presentationml/2006/main">
+  <p:cSld>
+    <p:spTree>
+      <p:nvGrpSpPr>
+        <p:cNvPr id="1" name=""/>
+        <p:cNvGrpSpPr/>
+        <p:nvPr/>
+      </p:nvGrpSpPr>
+      <p:grpSpPr>
+        <a:xfrm>
+          <a:off x="0" y="0"/>
+          <a:ext cx="0" cy="0"/>
+          <a:chOff x="0" y="0"/>
+          <a:chExt cx="0" cy="0"/>
+        </a:xfrm>
+      </p:grpSpPr>
+      <p:pic>
+        <p:nvPicPr>
+          <p:cNvPr id="4" name="Picture 3" descr="A diagram of different types of lines&#10;&#10;Description automatically generated">
+            <a:extLst>
+              <a:ext uri="{FF2B5EF4-FFF2-40B4-BE49-F238E27FC236}">
+                <a16:creationId xmlns:a16="http://schemas.microsoft.com/office/drawing/2014/main" id="{1014A864-B3B3-5380-0D49-D27BA40F769B}"/>
+              </a:ext>
+            </a:extLst>
+          </p:cNvPr>
+          <p:cNvPicPr>
+            <a:picLocks noChangeAspect="1"/>
+          </p:cNvPicPr>
+          <p:nvPr/>
+        </p:nvPicPr>
+        <p:blipFill>
+          <a:blip r:embed="rId2"/>
+          <a:stretch>
+            <a:fillRect/>
+          </a:stretch>
+        </p:blipFill>
+        <p:spPr>
+          <a:xfrm>
+            <a:off x="1275071" y="187859"/>
+            <a:ext cx="9641857" cy="6482281"/>
+          </a:xfrm>
+          <a:prstGeom prst="rect">
+            <a:avLst/>
+          </a:prstGeom>
+        </p:spPr>
+      </p:pic>
+    </p:spTree>
+    <p:extLst>
+      <p:ext uri="{BB962C8B-B14F-4D97-AF65-F5344CB8AC3E}">
+        <p14:creationId xmlns:p14="http://schemas.microsoft.com/office/powerpoint/2010/main" val="426165249"/>
+      </p:ext>
+    </p:extLst>
+  </p:cSld>
+  <p:clrMapOvr>
+    <a:masterClrMapping/>
+  </p:clrMapOvr>
+</p:sld>
+</file>
+
+<file path=ppt/slides/slide5.xml><?xml version="1.0" encoding="utf-8"?>
 <p:sld xmlns:a="http://schemas.openxmlformats.org/drawingml/2006/main" xmlns:r="http://schemas.openxmlformats.org/officeDocument/2006/relationships" xmlns:p="http://schemas.openxmlformats.org/presentationml/2006/main">
   <p:cSld>
     <p:spTree>
@@ -9153,7 +9949,7 @@
 </p:sld>
 </file>
 
-<file path=ppt/slides/slide5.xml><?xml version="1.0" encoding="utf-8"?>
+<file path=ppt/slides/slide6.xml><?xml version="1.0" encoding="utf-8"?>
 <p:sld xmlns:a="http://schemas.openxmlformats.org/drawingml/2006/main" xmlns:r="http://schemas.openxmlformats.org/officeDocument/2006/relationships" xmlns:p="http://schemas.openxmlformats.org/presentationml/2006/main">
   <p:cSld>
     <p:spTree>
@@ -9283,10 +10079,85 @@
   <p:clrMapOvr>
     <a:masterClrMapping/>
   </p:clrMapOvr>
+  <p:timing>
+    <p:tnLst>
+      <p:par>
+        <p:cTn id="1" dur="indefinite" restart="never" nodeType="tmRoot">
+          <p:childTnLst>
+            <p:seq concurrent="1" nextAc="seek">
+              <p:cTn id="2" dur="indefinite" nodeType="mainSeq">
+                <p:childTnLst>
+                  <p:par>
+                    <p:cTn id="3" fill="hold">
+                      <p:stCondLst>
+                        <p:cond delay="indefinite"/>
+                      </p:stCondLst>
+                      <p:childTnLst>
+                        <p:par>
+                          <p:cTn id="4" fill="hold">
+                            <p:stCondLst>
+                              <p:cond delay="0"/>
+                            </p:stCondLst>
+                            <p:childTnLst>
+                              <p:par>
+                                <p:cTn id="5" presetID="1" presetClass="entr" presetSubtype="0" fill="hold" nodeType="clickEffect">
+                                  <p:stCondLst>
+                                    <p:cond delay="0"/>
+                                  </p:stCondLst>
+                                  <p:childTnLst>
+                                    <p:set>
+                                      <p:cBhvr>
+                                        <p:cTn id="6" dur="1" fill="hold">
+                                          <p:stCondLst>
+                                            <p:cond delay="0"/>
+                                          </p:stCondLst>
+                                        </p:cTn>
+                                        <p:tgtEl>
+                                          <p:spTgt spid="9"/>
+                                        </p:tgtEl>
+                                        <p:attrNameLst>
+                                          <p:attrName>style.visibility</p:attrName>
+                                        </p:attrNameLst>
+                                      </p:cBhvr>
+                                      <p:to>
+                                        <p:strVal val="visible"/>
+                                      </p:to>
+                                    </p:set>
+                                  </p:childTnLst>
+                                </p:cTn>
+                              </p:par>
+                            </p:childTnLst>
+                          </p:cTn>
+                        </p:par>
+                      </p:childTnLst>
+                    </p:cTn>
+                  </p:par>
+                </p:childTnLst>
+              </p:cTn>
+              <p:prevCondLst>
+                <p:cond evt="onPrev" delay="0">
+                  <p:tgtEl>
+                    <p:sldTgt/>
+                  </p:tgtEl>
+                </p:cond>
+              </p:prevCondLst>
+              <p:nextCondLst>
+                <p:cond evt="onNext" delay="0">
+                  <p:tgtEl>
+                    <p:sldTgt/>
+                  </p:tgtEl>
+                </p:cond>
+              </p:nextCondLst>
+            </p:seq>
+          </p:childTnLst>
+        </p:cTn>
+      </p:par>
+    </p:tnLst>
+  </p:timing>
 </p:sld>
 </file>
 
-<file path=ppt/slides/slide6.xml><?xml version="1.0" encoding="utf-8"?>
+<file path=ppt/slides/slide7.xml><?xml version="1.0" encoding="utf-8"?>
 <p:sld xmlns:a="http://schemas.openxmlformats.org/drawingml/2006/main" xmlns:r="http://schemas.openxmlformats.org/officeDocument/2006/relationships" xmlns:p="http://schemas.openxmlformats.org/presentationml/2006/main">
   <p:cSld>
     <p:spTree>
@@ -9409,7 +10280,7 @@
 </p:sld>
 </file>
 
-<file path=ppt/slides/slide7.xml><?xml version="1.0" encoding="utf-8"?>
+<file path=ppt/slides/slide8.xml><?xml version="1.0" encoding="utf-8"?>
 <p:sld xmlns:a="http://schemas.openxmlformats.org/drawingml/2006/main" xmlns:r="http://schemas.openxmlformats.org/officeDocument/2006/relationships" xmlns:p="http://schemas.openxmlformats.org/presentationml/2006/main">
   <p:cSld>
     <p:spTree>
@@ -9533,7 +10404,7 @@
 </p:sld>
 </file>
 
-<file path=ppt/slides/slide8.xml><?xml version="1.0" encoding="utf-8"?>
+<file path=ppt/slides/slide9.xml><?xml version="1.0" encoding="utf-8"?>
 <p:sld xmlns:a="http://schemas.openxmlformats.org/drawingml/2006/main" xmlns:r="http://schemas.openxmlformats.org/officeDocument/2006/relationships" xmlns:p="http://schemas.openxmlformats.org/presentationml/2006/main">
   <p:cSld>
     <p:spTree>
@@ -9709,121 +10580,6 @@
     <p:extLst>
       <p:ext uri="{BB962C8B-B14F-4D97-AF65-F5344CB8AC3E}">
         <p14:creationId xmlns:p14="http://schemas.microsoft.com/office/powerpoint/2010/main" val="3614067962"/>
-      </p:ext>
-    </p:extLst>
-  </p:cSld>
-  <p:clrMapOvr>
-    <a:masterClrMapping/>
-  </p:clrMapOvr>
-</p:sld>
-</file>
-
-<file path=ppt/slides/slide9.xml><?xml version="1.0" encoding="utf-8"?>
-<p:sld xmlns:a="http://schemas.openxmlformats.org/drawingml/2006/main" xmlns:r="http://schemas.openxmlformats.org/officeDocument/2006/relationships" xmlns:p="http://schemas.openxmlformats.org/presentationml/2006/main">
-  <p:cSld>
-    <p:spTree>
-      <p:nvGrpSpPr>
-        <p:cNvPr id="1" name=""/>
-        <p:cNvGrpSpPr/>
-        <p:nvPr/>
-      </p:nvGrpSpPr>
-      <p:grpSpPr>
-        <a:xfrm>
-          <a:off x="0" y="0"/>
-          <a:ext cx="0" cy="0"/>
-          <a:chOff x="0" y="0"/>
-          <a:chExt cx="0" cy="0"/>
-        </a:xfrm>
-      </p:grpSpPr>
-      <p:sp>
-        <p:nvSpPr>
-          <p:cNvPr id="2" name="Title 1">
-            <a:extLst>
-              <a:ext uri="{FF2B5EF4-FFF2-40B4-BE49-F238E27FC236}">
-                <a16:creationId xmlns:a16="http://schemas.microsoft.com/office/drawing/2014/main" id="{B16402BF-BC41-8612-E5A9-BCBAE6923C2C}"/>
-              </a:ext>
-            </a:extLst>
-          </p:cNvPr>
-          <p:cNvSpPr>
-            <a:spLocks noGrp="1"/>
-          </p:cNvSpPr>
-          <p:nvPr>
-            <p:ph type="title"/>
-          </p:nvPr>
-        </p:nvSpPr>
-        <p:spPr/>
-        <p:txBody>
-          <a:bodyPr/>
-          <a:lstStyle/>
-          <a:p>
-            <a:r>
-              <a:rPr lang="en-US" dirty="0"/>
-              <a:t>Future Directions</a:t>
-            </a:r>
-          </a:p>
-        </p:txBody>
-      </p:sp>
-      <p:sp>
-        <p:nvSpPr>
-          <p:cNvPr id="3" name="Content Placeholder 2">
-            <a:extLst>
-              <a:ext uri="{FF2B5EF4-FFF2-40B4-BE49-F238E27FC236}">
-                <a16:creationId xmlns:a16="http://schemas.microsoft.com/office/drawing/2014/main" id="{22304B87-6C6B-04C5-1FC7-E58797F546BD}"/>
-              </a:ext>
-            </a:extLst>
-          </p:cNvPr>
-          <p:cNvSpPr>
-            <a:spLocks noGrp="1"/>
-          </p:cNvSpPr>
-          <p:nvPr>
-            <p:ph idx="1"/>
-          </p:nvPr>
-        </p:nvSpPr>
-        <p:spPr/>
-        <p:txBody>
-          <a:bodyPr>
-            <a:normAutofit fontScale="92500" lnSpcReduction="20000"/>
-          </a:bodyPr>
-          <a:lstStyle/>
-          <a:p>
-            <a:r>
-              <a:rPr lang="en-US" dirty="0"/>
-              <a:t>Small errors in annotation can lead to increased false positives and increase low-throughput manual curation</a:t>
-            </a:r>
-          </a:p>
-          <a:p>
-            <a:endParaRPr lang="en-US" dirty="0"/>
-          </a:p>
-          <a:p>
-            <a:r>
-              <a:rPr lang="en-US" dirty="0"/>
-              <a:t>Diagnostic efforts are limited by high splicing tool output volume, but improved curation could provide substantial filtering power</a:t>
-            </a:r>
-          </a:p>
-          <a:p>
-            <a:endParaRPr lang="en-US" dirty="0"/>
-          </a:p>
-          <a:p>
-            <a:r>
-              <a:rPr lang="en-US" dirty="0"/>
-              <a:t>Unannotated junctions may highlight mis-mapping or unannotated isoforms, particularly when associated with high read counts</a:t>
-            </a:r>
-          </a:p>
-          <a:p>
-            <a:endParaRPr lang="en-US" dirty="0"/>
-          </a:p>
-          <a:p>
-            <a:r>
-              <a:rPr lang="en-US" dirty="0"/>
-              <a:t>Diagnostic utility will be further improved by protein level predictions, e.g., p. coordinates and functional domains</a:t>
-            </a:r>
-          </a:p>
-        </p:txBody>
-      </p:sp>
-    </p:spTree>
-    <p:extLst>
-      <p:ext uri="{BB962C8B-B14F-4D97-AF65-F5344CB8AC3E}">
-        <p14:creationId xmlns:p14="http://schemas.microsoft.com/office/powerpoint/2010/main" val="601041608"/>
       </p:ext>
     </p:extLst>
   </p:cSld>

</xml_diff>